<commit_message>
Update DG and UG
</commit_message>
<xml_diff>
--- a/docs/diagrams/LogicComponentSequenceDiagram.pptx
+++ b/docs/diagrams/LogicComponentSequenceDiagram.pptx
@@ -5,12 +5,14 @@
     <p:sldMasterId id="2147483648" r:id="rId1"/>
   </p:sldMasterIdLst>
   <p:notesMasterIdLst>
-    <p:notesMasterId r:id="rId3"/>
+    <p:notesMasterId r:id="rId5"/>
   </p:notesMasterIdLst>
   <p:sldIdLst>
     <p:sldId id="267" r:id="rId2"/>
+    <p:sldId id="268" r:id="rId3"/>
+    <p:sldId id="269" r:id="rId4"/>
   </p:sldIdLst>
-  <p:sldSz cx="9144000" cy="6858000" type="screen4x3"/>
+  <p:sldSz cx="12192000" cy="6858000"/>
   <p:notesSz cx="6858000" cy="9144000"/>
   <p:defaultTextStyle>
     <a:defPPr>
@@ -110,12 +112,12 @@
   <p:extLst>
     <p:ext uri="{EFAFB233-063F-42B5-8137-9DF3F51BA10A}">
       <p15:sldGuideLst xmlns:p15="http://schemas.microsoft.com/office/powerpoint/2012/main">
-        <p15:guide id="1" orient="horz" pos="1488">
+        <p15:guide id="1" orient="horz" pos="1488" userDrawn="1">
           <p15:clr>
             <a:srgbClr val="A4A3A4"/>
           </p15:clr>
         </p15:guide>
-        <p15:guide id="2" pos="2880">
+        <p15:guide id="2" pos="3840" userDrawn="1">
           <p15:clr>
             <a:srgbClr val="A4A3A4"/>
           </p15:clr>
@@ -212,7 +214,7 @@
           <a:p>
             <a:fld id="{F5CC4B3F-88C1-4FFA-B1B6-F41C21DC6924}" type="datetimeFigureOut">
               <a:rPr lang="en-US" smtClean="0"/>
-              <a:t>4/5/2018</a:t>
+              <a:t>4/12/18</a:t>
             </a:fld>
             <a:endParaRPr lang="en-US"/>
           </a:p>
@@ -230,8 +232,8 @@
         </p:nvSpPr>
         <p:spPr>
           <a:xfrm>
-            <a:off x="1143000" y="685800"/>
-            <a:ext cx="4572000" cy="3429000"/>
+            <a:off x="381000" y="685800"/>
+            <a:ext cx="6096000" cy="3429000"/>
           </a:xfrm>
           <a:prstGeom prst="rect">
             <a:avLst/>
@@ -508,8 +510,8 @@
         </p:nvSpPr>
         <p:spPr>
           <a:xfrm>
-            <a:off x="685800" y="2130425"/>
-            <a:ext cx="7772400" cy="1470025"/>
+            <a:off x="914400" y="2130426"/>
+            <a:ext cx="10363200" cy="1470025"/>
           </a:xfrm>
         </p:spPr>
         <p:txBody>
@@ -535,8 +537,8 @@
         </p:nvSpPr>
         <p:spPr>
           <a:xfrm>
-            <a:off x="1371600" y="3886200"/>
-            <a:ext cx="6400800" cy="1752600"/>
+            <a:off x="1828800" y="3886200"/>
+            <a:ext cx="8534400" cy="1752600"/>
           </a:xfrm>
         </p:spPr>
         <p:txBody>
@@ -658,7 +660,7 @@
           <a:p>
             <a:fld id="{78C97017-6FC3-485B-9764-EAC9E56C1D49}" type="datetimeFigureOut">
               <a:rPr lang="en-US" smtClean="0"/>
-              <a:t>4/5/2018</a:t>
+              <a:t>4/12/18</a:t>
             </a:fld>
             <a:endParaRPr lang="en-US"/>
           </a:p>
@@ -826,7 +828,7 @@
           <a:p>
             <a:fld id="{78C97017-6FC3-485B-9764-EAC9E56C1D49}" type="datetimeFigureOut">
               <a:rPr lang="en-US" smtClean="0"/>
-              <a:t>4/5/2018</a:t>
+              <a:t>4/12/18</a:t>
             </a:fld>
             <a:endParaRPr lang="en-US"/>
           </a:p>
@@ -916,8 +918,8 @@
         </p:nvSpPr>
         <p:spPr>
           <a:xfrm>
-            <a:off x="6629400" y="274638"/>
-            <a:ext cx="2057400" cy="5851525"/>
+            <a:off x="8839200" y="274639"/>
+            <a:ext cx="2743200" cy="5851525"/>
           </a:xfrm>
         </p:spPr>
         <p:txBody>
@@ -943,8 +945,8 @@
         </p:nvSpPr>
         <p:spPr>
           <a:xfrm>
-            <a:off x="457200" y="274638"/>
-            <a:ext cx="6019800" cy="5851525"/>
+            <a:off x="609600" y="274639"/>
+            <a:ext cx="8026400" cy="5851525"/>
           </a:xfrm>
         </p:spPr>
         <p:txBody>
@@ -1004,7 +1006,7 @@
           <a:p>
             <a:fld id="{78C97017-6FC3-485B-9764-EAC9E56C1D49}" type="datetimeFigureOut">
               <a:rPr lang="en-US" smtClean="0"/>
-              <a:t>4/5/2018</a:t>
+              <a:t>4/12/18</a:t>
             </a:fld>
             <a:endParaRPr lang="en-US"/>
           </a:p>
@@ -1172,7 +1174,7 @@
           <a:p>
             <a:fld id="{78C97017-6FC3-485B-9764-EAC9E56C1D49}" type="datetimeFigureOut">
               <a:rPr lang="en-US" smtClean="0"/>
-              <a:t>4/5/2018</a:t>
+              <a:t>4/12/18</a:t>
             </a:fld>
             <a:endParaRPr lang="en-US"/>
           </a:p>
@@ -1262,8 +1264,8 @@
         </p:nvSpPr>
         <p:spPr>
           <a:xfrm>
-            <a:off x="722313" y="4406900"/>
-            <a:ext cx="7772400" cy="1362075"/>
+            <a:off x="963084" y="4406901"/>
+            <a:ext cx="10363200" cy="1362075"/>
           </a:xfrm>
         </p:spPr>
         <p:txBody>
@@ -1293,8 +1295,8 @@
         </p:nvSpPr>
         <p:spPr>
           <a:xfrm>
-            <a:off x="722313" y="2906713"/>
-            <a:ext cx="7772400" cy="1500187"/>
+            <a:off x="963084" y="2906713"/>
+            <a:ext cx="10363200" cy="1500187"/>
           </a:xfrm>
         </p:spPr>
         <p:txBody>
@@ -1417,7 +1419,7 @@
           <a:p>
             <a:fld id="{78C97017-6FC3-485B-9764-EAC9E56C1D49}" type="datetimeFigureOut">
               <a:rPr lang="en-US" smtClean="0"/>
-              <a:t>4/5/2018</a:t>
+              <a:t>4/12/18</a:t>
             </a:fld>
             <a:endParaRPr lang="en-US"/>
           </a:p>
@@ -1529,8 +1531,8 @@
         </p:nvSpPr>
         <p:spPr>
           <a:xfrm>
-            <a:off x="457200" y="1600200"/>
-            <a:ext cx="4038600" cy="4525963"/>
+            <a:off x="609600" y="1600201"/>
+            <a:ext cx="5384800" cy="4525963"/>
           </a:xfrm>
         </p:spPr>
         <p:txBody>
@@ -1613,8 +1615,8 @@
         </p:nvSpPr>
         <p:spPr>
           <a:xfrm>
-            <a:off x="4648200" y="1600200"/>
-            <a:ext cx="4038600" cy="4525963"/>
+            <a:off x="6197600" y="1600201"/>
+            <a:ext cx="5384800" cy="4525963"/>
           </a:xfrm>
         </p:spPr>
         <p:txBody>
@@ -1702,7 +1704,7 @@
           <a:p>
             <a:fld id="{78C97017-6FC3-485B-9764-EAC9E56C1D49}" type="datetimeFigureOut">
               <a:rPr lang="en-US" smtClean="0"/>
-              <a:t>4/5/2018</a:t>
+              <a:t>4/12/18</a:t>
             </a:fld>
             <a:endParaRPr lang="en-US"/>
           </a:p>
@@ -1818,8 +1820,8 @@
         </p:nvSpPr>
         <p:spPr>
           <a:xfrm>
-            <a:off x="457200" y="1535113"/>
-            <a:ext cx="4040188" cy="639762"/>
+            <a:off x="609600" y="1535113"/>
+            <a:ext cx="5386917" cy="639762"/>
           </a:xfrm>
         </p:spPr>
         <p:txBody>
@@ -1883,8 +1885,8 @@
         </p:nvSpPr>
         <p:spPr>
           <a:xfrm>
-            <a:off x="457200" y="2174875"/>
-            <a:ext cx="4040188" cy="3951288"/>
+            <a:off x="609600" y="2174875"/>
+            <a:ext cx="5386917" cy="3951288"/>
           </a:xfrm>
         </p:spPr>
         <p:txBody>
@@ -1967,8 +1969,8 @@
         </p:nvSpPr>
         <p:spPr>
           <a:xfrm>
-            <a:off x="4645025" y="1535113"/>
-            <a:ext cx="4041775" cy="639762"/>
+            <a:off x="6193368" y="1535113"/>
+            <a:ext cx="5389033" cy="639762"/>
           </a:xfrm>
         </p:spPr>
         <p:txBody>
@@ -2032,8 +2034,8 @@
         </p:nvSpPr>
         <p:spPr>
           <a:xfrm>
-            <a:off x="4645025" y="2174875"/>
-            <a:ext cx="4041775" cy="3951288"/>
+            <a:off x="6193368" y="2174875"/>
+            <a:ext cx="5389033" cy="3951288"/>
           </a:xfrm>
         </p:spPr>
         <p:txBody>
@@ -2121,7 +2123,7 @@
           <a:p>
             <a:fld id="{78C97017-6FC3-485B-9764-EAC9E56C1D49}" type="datetimeFigureOut">
               <a:rPr lang="en-US" smtClean="0"/>
-              <a:t>4/5/2018</a:t>
+              <a:t>4/12/18</a:t>
             </a:fld>
             <a:endParaRPr lang="en-US"/>
           </a:p>
@@ -2238,7 +2240,7 @@
           <a:p>
             <a:fld id="{78C97017-6FC3-485B-9764-EAC9E56C1D49}" type="datetimeFigureOut">
               <a:rPr lang="en-US" smtClean="0"/>
-              <a:t>4/5/2018</a:t>
+              <a:t>4/12/18</a:t>
             </a:fld>
             <a:endParaRPr lang="en-US"/>
           </a:p>
@@ -2333,7 +2335,7 @@
           <a:p>
             <a:fld id="{78C97017-6FC3-485B-9764-EAC9E56C1D49}" type="datetimeFigureOut">
               <a:rPr lang="en-US" smtClean="0"/>
-              <a:t>4/5/2018</a:t>
+              <a:t>4/12/18</a:t>
             </a:fld>
             <a:endParaRPr lang="en-US"/>
           </a:p>
@@ -2423,8 +2425,8 @@
         </p:nvSpPr>
         <p:spPr>
           <a:xfrm>
-            <a:off x="457200" y="273050"/>
-            <a:ext cx="3008313" cy="1162050"/>
+            <a:off x="609601" y="273050"/>
+            <a:ext cx="4011084" cy="1162050"/>
           </a:xfrm>
         </p:spPr>
         <p:txBody>
@@ -2454,8 +2456,8 @@
         </p:nvSpPr>
         <p:spPr>
           <a:xfrm>
-            <a:off x="3575050" y="273050"/>
-            <a:ext cx="5111750" cy="5853113"/>
+            <a:off x="4766733" y="273051"/>
+            <a:ext cx="6815667" cy="5853113"/>
           </a:xfrm>
         </p:spPr>
         <p:txBody>
@@ -2538,8 +2540,8 @@
         </p:nvSpPr>
         <p:spPr>
           <a:xfrm>
-            <a:off x="457200" y="1435100"/>
-            <a:ext cx="3008313" cy="4691063"/>
+            <a:off x="609601" y="1435101"/>
+            <a:ext cx="4011084" cy="4691063"/>
           </a:xfrm>
         </p:spPr>
         <p:txBody>
@@ -2608,7 +2610,7 @@
           <a:p>
             <a:fld id="{78C97017-6FC3-485B-9764-EAC9E56C1D49}" type="datetimeFigureOut">
               <a:rPr lang="en-US" smtClean="0"/>
-              <a:t>4/5/2018</a:t>
+              <a:t>4/12/18</a:t>
             </a:fld>
             <a:endParaRPr lang="en-US"/>
           </a:p>
@@ -2698,8 +2700,8 @@
         </p:nvSpPr>
         <p:spPr>
           <a:xfrm>
-            <a:off x="1792288" y="4800600"/>
-            <a:ext cx="5486400" cy="566738"/>
+            <a:off x="2389717" y="4800600"/>
+            <a:ext cx="7315200" cy="566738"/>
           </a:xfrm>
         </p:spPr>
         <p:txBody>
@@ -2729,8 +2731,8 @@
         </p:nvSpPr>
         <p:spPr>
           <a:xfrm>
-            <a:off x="1792288" y="612775"/>
-            <a:ext cx="5486400" cy="4114800"/>
+            <a:off x="2389717" y="612775"/>
+            <a:ext cx="7315200" cy="4114800"/>
           </a:xfrm>
         </p:spPr>
         <p:txBody>
@@ -2790,8 +2792,8 @@
         </p:nvSpPr>
         <p:spPr>
           <a:xfrm>
-            <a:off x="1792288" y="5367338"/>
-            <a:ext cx="5486400" cy="804862"/>
+            <a:off x="2389717" y="5367338"/>
+            <a:ext cx="7315200" cy="804862"/>
           </a:xfrm>
         </p:spPr>
         <p:txBody>
@@ -2860,7 +2862,7 @@
           <a:p>
             <a:fld id="{78C97017-6FC3-485B-9764-EAC9E56C1D49}" type="datetimeFigureOut">
               <a:rPr lang="en-US" smtClean="0"/>
-              <a:t>4/5/2018</a:t>
+              <a:t>4/12/18</a:t>
             </a:fld>
             <a:endParaRPr lang="en-US"/>
           </a:p>
@@ -2955,8 +2957,8 @@
         </p:nvSpPr>
         <p:spPr>
           <a:xfrm>
-            <a:off x="457200" y="274638"/>
-            <a:ext cx="8229600" cy="1143000"/>
+            <a:off x="609600" y="274638"/>
+            <a:ext cx="10972800" cy="1143000"/>
           </a:xfrm>
           <a:prstGeom prst="rect">
             <a:avLst/>
@@ -2987,8 +2989,8 @@
         </p:nvSpPr>
         <p:spPr>
           <a:xfrm>
-            <a:off x="457200" y="1600200"/>
-            <a:ext cx="8229600" cy="4525963"/>
+            <a:off x="609600" y="1600201"/>
+            <a:ext cx="10972800" cy="4525963"/>
           </a:xfrm>
           <a:prstGeom prst="rect">
             <a:avLst/>
@@ -3048,8 +3050,8 @@
         </p:nvSpPr>
         <p:spPr>
           <a:xfrm>
-            <a:off x="457200" y="6356350"/>
-            <a:ext cx="2133600" cy="365125"/>
+            <a:off x="609600" y="6356351"/>
+            <a:ext cx="2844800" cy="365125"/>
           </a:xfrm>
           <a:prstGeom prst="rect">
             <a:avLst/>
@@ -3071,7 +3073,7 @@
           <a:p>
             <a:fld id="{78C97017-6FC3-485B-9764-EAC9E56C1D49}" type="datetimeFigureOut">
               <a:rPr lang="en-US" smtClean="0"/>
-              <a:t>4/5/2018</a:t>
+              <a:t>4/12/18</a:t>
             </a:fld>
             <a:endParaRPr lang="en-US"/>
           </a:p>
@@ -3089,8 +3091,8 @@
         </p:nvSpPr>
         <p:spPr>
           <a:xfrm>
-            <a:off x="3124200" y="6356350"/>
-            <a:ext cx="2895600" cy="365125"/>
+            <a:off x="4165600" y="6356351"/>
+            <a:ext cx="3860800" cy="365125"/>
           </a:xfrm>
           <a:prstGeom prst="rect">
             <a:avLst/>
@@ -3126,8 +3128,8 @@
         </p:nvSpPr>
         <p:spPr>
           <a:xfrm>
-            <a:off x="6553200" y="6356350"/>
-            <a:ext cx="2133600" cy="365125"/>
+            <a:off x="8737600" y="6356351"/>
+            <a:ext cx="2844800" cy="365125"/>
           </a:xfrm>
           <a:prstGeom prst="rect">
             <a:avLst/>
@@ -3454,7 +3456,7 @@
         </p:nvSpPr>
         <p:spPr>
           <a:xfrm>
-            <a:off x="685800" y="1981200"/>
+            <a:off x="2209800" y="1981200"/>
             <a:ext cx="7252956" cy="4000286"/>
           </a:xfrm>
           <a:prstGeom prst="roundRect">
@@ -3515,7 +3517,7 @@
         </p:nvSpPr>
         <p:spPr>
           <a:xfrm>
-            <a:off x="845045" y="2296546"/>
+            <a:off x="2369046" y="2296546"/>
             <a:ext cx="1455629" cy="346760"/>
           </a:xfrm>
           <a:prstGeom prst="rect">
@@ -3582,7 +3584,7 @@
         </p:nvCxnSpPr>
         <p:spPr>
           <a:xfrm>
-            <a:off x="1572859" y="2660217"/>
+            <a:off x="3096859" y="2660218"/>
             <a:ext cx="0" cy="2597583"/>
           </a:xfrm>
           <a:prstGeom prst="line">
@@ -3619,7 +3621,7 @@
         </p:nvSpPr>
         <p:spPr>
           <a:xfrm>
-            <a:off x="1500851" y="3010911"/>
+            <a:off x="3024851" y="3010912"/>
             <a:ext cx="152400" cy="2780287"/>
           </a:xfrm>
           <a:prstGeom prst="rect">
@@ -3666,7 +3668,7 @@
         </p:nvSpPr>
         <p:spPr>
           <a:xfrm>
-            <a:off x="2743200" y="2179309"/>
+            <a:off x="4267200" y="2179309"/>
             <a:ext cx="1447800" cy="467684"/>
           </a:xfrm>
           <a:prstGeom prst="rect">
@@ -3733,7 +3735,7 @@
         </p:nvCxnSpPr>
         <p:spPr>
           <a:xfrm>
-            <a:off x="3356599" y="2663904"/>
+            <a:off x="4880599" y="2663904"/>
             <a:ext cx="0" cy="1695374"/>
           </a:xfrm>
           <a:prstGeom prst="line">
@@ -3770,7 +3772,7 @@
         </p:nvSpPr>
         <p:spPr>
           <a:xfrm>
-            <a:off x="3284590" y="3122096"/>
+            <a:off x="4808591" y="3122097"/>
             <a:ext cx="174929" cy="1129459"/>
           </a:xfrm>
           <a:prstGeom prst="rect">
@@ -3805,11 +3807,7 @@
           <a:lstStyle/>
           <a:p>
             <a:pPr algn="ctr"/>
-            <a:endParaRPr lang="en-SG" sz="1400">
-              <a:solidFill>
-                <a:schemeClr val="dk1"/>
-              </a:solidFill>
-            </a:endParaRPr>
+            <a:endParaRPr lang="en-SG" sz="1400"/>
           </a:p>
         </p:txBody>
       </p:sp>
@@ -3821,7 +3819,7 @@
         </p:nvSpPr>
         <p:spPr>
           <a:xfrm>
-            <a:off x="6172200" y="3312740"/>
+            <a:off x="7696201" y="3312740"/>
             <a:ext cx="1398435" cy="461538"/>
           </a:xfrm>
           <a:prstGeom prst="rect">
@@ -3897,7 +3895,7 @@
         </p:nvCxnSpPr>
         <p:spPr>
           <a:xfrm>
-            <a:off x="6772574" y="3774278"/>
+            <a:off x="8296574" y="3774278"/>
             <a:ext cx="0" cy="1940722"/>
           </a:xfrm>
           <a:prstGeom prst="line">
@@ -3934,7 +3932,7 @@
         </p:nvSpPr>
         <p:spPr>
           <a:xfrm>
-            <a:off x="6696374" y="3774278"/>
+            <a:off x="8220374" y="3774279"/>
             <a:ext cx="152400" cy="276003"/>
           </a:xfrm>
           <a:prstGeom prst="rect">
@@ -3981,7 +3979,7 @@
         </p:nvCxnSpPr>
         <p:spPr>
           <a:xfrm>
-            <a:off x="381000" y="3014599"/>
+            <a:off x="1905001" y="3014599"/>
             <a:ext cx="1119851" cy="0"/>
           </a:xfrm>
           <a:prstGeom prst="straightConnector1">
@@ -4017,7 +4015,7 @@
         </p:nvCxnSpPr>
         <p:spPr>
           <a:xfrm flipV="1">
-            <a:off x="1653251" y="3122097"/>
+            <a:off x="3177251" y="3122098"/>
             <a:ext cx="1596514" cy="1"/>
           </a:xfrm>
           <a:prstGeom prst="straightConnector1">
@@ -4053,7 +4051,7 @@
         </p:nvSpPr>
         <p:spPr>
           <a:xfrm>
-            <a:off x="-387822" y="2788977"/>
+            <a:off x="1136178" y="2788977"/>
             <a:ext cx="1905000" cy="184666"/>
           </a:xfrm>
           <a:prstGeom prst="rect">
@@ -4103,7 +4101,7 @@
         </p:nvCxnSpPr>
         <p:spPr>
           <a:xfrm flipV="1">
-            <a:off x="5257218" y="3703214"/>
+            <a:off x="6781218" y="3703215"/>
             <a:ext cx="922392" cy="1"/>
           </a:xfrm>
           <a:prstGeom prst="straightConnector1">
@@ -4139,7 +4137,7 @@
         </p:nvSpPr>
         <p:spPr>
           <a:xfrm>
-            <a:off x="4257582" y="4251556"/>
+            <a:off x="5781583" y="4251556"/>
             <a:ext cx="855809" cy="215444"/>
           </a:xfrm>
           <a:prstGeom prst="rect">
@@ -4179,7 +4177,7 @@
         </p:nvCxnSpPr>
         <p:spPr>
           <a:xfrm>
-            <a:off x="5257800" y="4050281"/>
+            <a:off x="6781800" y="4050281"/>
             <a:ext cx="1492974" cy="0"/>
           </a:xfrm>
           <a:prstGeom prst="straightConnector1">
@@ -4217,7 +4215,7 @@
         </p:nvCxnSpPr>
         <p:spPr>
           <a:xfrm flipV="1">
-            <a:off x="1670186" y="4243231"/>
+            <a:off x="3194186" y="4243231"/>
             <a:ext cx="1596514" cy="5378"/>
           </a:xfrm>
           <a:prstGeom prst="straightConnector1">
@@ -4255,7 +4253,7 @@
         </p:nvCxnSpPr>
         <p:spPr>
           <a:xfrm>
-            <a:off x="304800" y="5791200"/>
+            <a:off x="1828801" y="5791200"/>
             <a:ext cx="1196051" cy="0"/>
           </a:xfrm>
           <a:prstGeom prst="straightConnector1">
@@ -4293,7 +4291,7 @@
         </p:nvSpPr>
         <p:spPr>
           <a:xfrm>
-            <a:off x="8265896" y="2362200"/>
+            <a:off x="9789896" y="2362200"/>
             <a:ext cx="1030504" cy="346760"/>
           </a:xfrm>
           <a:prstGeom prst="rect">
@@ -4358,7 +4356,7 @@
         </p:nvCxnSpPr>
         <p:spPr>
           <a:xfrm>
-            <a:off x="1653251" y="4495317"/>
+            <a:off x="3177252" y="4495317"/>
             <a:ext cx="5043123" cy="0"/>
           </a:xfrm>
           <a:prstGeom prst="straightConnector1">
@@ -4394,7 +4392,7 @@
         </p:nvSpPr>
         <p:spPr>
           <a:xfrm>
-            <a:off x="6687452" y="4467000"/>
+            <a:off x="8211452" y="4467000"/>
             <a:ext cx="161322" cy="1019400"/>
           </a:xfrm>
           <a:prstGeom prst="rect">
@@ -4441,7 +4439,7 @@
         </p:nvCxnSpPr>
         <p:spPr>
           <a:xfrm>
-            <a:off x="8781148" y="2700858"/>
+            <a:off x="10305148" y="2700858"/>
             <a:ext cx="0" cy="2830598"/>
           </a:xfrm>
           <a:prstGeom prst="line">
@@ -4481,7 +4479,7 @@
         </p:nvSpPr>
         <p:spPr>
           <a:xfrm>
-            <a:off x="8686800" y="4524597"/>
+            <a:off x="10210800" y="4524598"/>
             <a:ext cx="152400" cy="199803"/>
           </a:xfrm>
           <a:prstGeom prst="rect">
@@ -4522,11 +4520,7 @@
           <a:lstStyle/>
           <a:p>
             <a:pPr algn="ctr"/>
-            <a:endParaRPr lang="en-SG" sz="1400">
-              <a:solidFill>
-                <a:schemeClr val="dk1"/>
-              </a:solidFill>
-            </a:endParaRPr>
+            <a:endParaRPr lang="en-SG" sz="1400"/>
           </a:p>
         </p:txBody>
       </p:sp>
@@ -4538,7 +4532,7 @@
         </p:nvCxnSpPr>
         <p:spPr>
           <a:xfrm>
-            <a:off x="6850663" y="4524597"/>
+            <a:off x="8374664" y="4524597"/>
             <a:ext cx="1836137" cy="0"/>
           </a:xfrm>
           <a:prstGeom prst="straightConnector1">
@@ -4574,7 +4568,7 @@
         </p:nvCxnSpPr>
         <p:spPr>
           <a:xfrm flipV="1">
-            <a:off x="6848774" y="4714650"/>
+            <a:off x="8372774" y="4714650"/>
             <a:ext cx="1838026" cy="9750"/>
           </a:xfrm>
           <a:prstGeom prst="straightConnector1">
@@ -4615,7 +4609,7 @@
         </p:nvCxnSpPr>
         <p:spPr>
           <a:xfrm>
-            <a:off x="1653251" y="5486400"/>
+            <a:off x="3177252" y="5486400"/>
             <a:ext cx="5052349" cy="0"/>
           </a:xfrm>
           <a:prstGeom prst="straightConnector1">
@@ -4653,7 +4647,7 @@
         </p:nvSpPr>
         <p:spPr>
           <a:xfrm>
-            <a:off x="6934200" y="4267200"/>
+            <a:off x="8458200" y="4267200"/>
             <a:ext cx="1589916" cy="215444"/>
           </a:xfrm>
           <a:prstGeom prst="rect">
@@ -4705,7 +4699,7 @@
         </p:nvSpPr>
         <p:spPr>
           <a:xfrm>
-            <a:off x="3847551" y="3657600"/>
+            <a:off x="5371552" y="3657600"/>
             <a:ext cx="767033" cy="184666"/>
           </a:xfrm>
           <a:prstGeom prst="rect">
@@ -4745,7 +4739,7 @@
         </p:nvSpPr>
         <p:spPr>
           <a:xfrm>
-            <a:off x="1553182" y="2874642"/>
+            <a:off x="3077183" y="2874642"/>
             <a:ext cx="1716537" cy="184666"/>
           </a:xfrm>
           <a:prstGeom prst="rect">
@@ -4793,7 +4787,7 @@
         </p:nvSpPr>
         <p:spPr>
           <a:xfrm>
-            <a:off x="4340137" y="5255323"/>
+            <a:off x="5864137" y="5255323"/>
             <a:ext cx="621216" cy="215444"/>
           </a:xfrm>
           <a:prstGeom prst="rect">
@@ -4833,7 +4827,7 @@
         </p:nvSpPr>
         <p:spPr>
           <a:xfrm>
-            <a:off x="599983" y="5538488"/>
+            <a:off x="2123983" y="5538488"/>
             <a:ext cx="762000" cy="215444"/>
           </a:xfrm>
           <a:prstGeom prst="rect">
@@ -4873,7 +4867,7 @@
         </p:nvSpPr>
         <p:spPr>
           <a:xfrm>
-            <a:off x="7020246" y="4777286"/>
+            <a:off x="8544246" y="4777286"/>
             <a:ext cx="1590354" cy="461538"/>
           </a:xfrm>
           <a:prstGeom prst="rect">
@@ -4940,7 +4934,7 @@
         </p:nvSpPr>
         <p:spPr>
           <a:xfrm>
-            <a:off x="7777323" y="5238824"/>
+            <a:off x="9301323" y="5238824"/>
             <a:ext cx="152400" cy="171376"/>
           </a:xfrm>
           <a:prstGeom prst="rect">
@@ -4987,7 +4981,7 @@
         </p:nvCxnSpPr>
         <p:spPr>
           <a:xfrm>
-            <a:off x="6858000" y="5410200"/>
+            <a:off x="8382000" y="5410200"/>
             <a:ext cx="966624" cy="0"/>
           </a:xfrm>
           <a:prstGeom prst="straightConnector1">
@@ -5025,7 +5019,7 @@
         </p:nvSpPr>
         <p:spPr>
           <a:xfrm>
-            <a:off x="2673845" y="4027787"/>
+            <a:off x="4197846" y="4027787"/>
             <a:ext cx="220343" cy="215444"/>
           </a:xfrm>
           <a:prstGeom prst="rect">
@@ -5065,7 +5059,7 @@
         </p:nvSpPr>
         <p:spPr>
           <a:xfrm>
-            <a:off x="4114800" y="2929839"/>
+            <a:off x="5638801" y="2929840"/>
             <a:ext cx="2016419" cy="432035"/>
           </a:xfrm>
           <a:prstGeom prst="rect">
@@ -5148,7 +5142,7 @@
         </p:nvCxnSpPr>
         <p:spPr>
           <a:xfrm>
-            <a:off x="3462591" y="3657600"/>
+            <a:off x="4986591" y="3657601"/>
             <a:ext cx="1597356" cy="1"/>
           </a:xfrm>
           <a:prstGeom prst="straightConnector1">
@@ -5182,7 +5176,7 @@
         </p:nvSpPr>
         <p:spPr>
           <a:xfrm>
-            <a:off x="5059947" y="3352800"/>
+            <a:off x="6583948" y="3352801"/>
             <a:ext cx="205843" cy="123165"/>
           </a:xfrm>
           <a:prstGeom prst="rect">
@@ -5231,7 +5225,7 @@
         </p:nvCxnSpPr>
         <p:spPr>
           <a:xfrm>
-            <a:off x="5162869" y="3352800"/>
+            <a:off x="6686869" y="3352800"/>
             <a:ext cx="0" cy="990600"/>
           </a:xfrm>
           <a:prstGeom prst="line">
@@ -5268,7 +5262,7 @@
         </p:nvSpPr>
         <p:spPr>
           <a:xfrm>
-            <a:off x="5059947" y="3657601"/>
+            <a:off x="6583948" y="3657601"/>
             <a:ext cx="205843" cy="533400"/>
           </a:xfrm>
           <a:prstGeom prst="rect">
@@ -5315,7 +5309,7 @@
         </p:nvCxnSpPr>
         <p:spPr>
           <a:xfrm>
-            <a:off x="3499382" y="4185073"/>
+            <a:off x="5023383" y="4185073"/>
             <a:ext cx="1667219" cy="0"/>
           </a:xfrm>
           <a:prstGeom prst="straightConnector1">
@@ -5353,7 +5347,7 @@
         </p:nvCxnSpPr>
         <p:spPr>
           <a:xfrm>
-            <a:off x="6858000" y="5029200"/>
+            <a:off x="8382000" y="5029200"/>
             <a:ext cx="162246" cy="0"/>
           </a:xfrm>
           <a:prstGeom prst="straightConnector1">
@@ -5389,7 +5383,7 @@
         </p:nvCxnSpPr>
         <p:spPr>
           <a:xfrm>
-            <a:off x="3412425" y="3173004"/>
+            <a:off x="4936426" y="3173004"/>
             <a:ext cx="702375" cy="0"/>
           </a:xfrm>
           <a:prstGeom prst="straightConnector1">
@@ -5425,7 +5419,7 @@
         </p:nvCxnSpPr>
         <p:spPr>
           <a:xfrm>
-            <a:off x="3459519" y="3475965"/>
+            <a:off x="4983519" y="3475965"/>
             <a:ext cx="1600428" cy="0"/>
           </a:xfrm>
           <a:prstGeom prst="straightConnector1">
@@ -5463,7 +5457,7 @@
         </p:nvSpPr>
         <p:spPr>
           <a:xfrm>
-            <a:off x="5033665" y="4199590"/>
+            <a:off x="6557665" y="4199590"/>
             <a:ext cx="258404" cy="261610"/>
           </a:xfrm>
           <a:prstGeom prst="rect">
@@ -5498,6 +5492,3327 @@
   <p:clrMapOvr>
     <a:masterClrMapping/>
   </p:clrMapOvr>
+  <p:timing>
+    <p:tnLst>
+      <p:par>
+        <p:cTn id="1" dur="indefinite" restart="never" nodeType="tmRoot"/>
+      </p:par>
+    </p:tnLst>
+  </p:timing>
+</p:sld>
+</file>
+
+<file path=ppt/slides/slide2.xml><?xml version="1.0" encoding="utf-8"?>
+<p:sld xmlns:a="http://schemas.openxmlformats.org/drawingml/2006/main" xmlns:r="http://schemas.openxmlformats.org/officeDocument/2006/relationships" xmlns:p="http://schemas.openxmlformats.org/presentationml/2006/main">
+  <p:cSld>
+    <p:spTree>
+      <p:nvGrpSpPr>
+        <p:cNvPr id="1" name=""/>
+        <p:cNvGrpSpPr/>
+        <p:nvPr/>
+      </p:nvGrpSpPr>
+      <p:grpSpPr>
+        <a:xfrm>
+          <a:off x="0" y="0"/>
+          <a:ext cx="0" cy="0"/>
+          <a:chOff x="0" y="0"/>
+          <a:chExt cx="0" cy="0"/>
+        </a:xfrm>
+      </p:grpSpPr>
+      <p:sp>
+        <p:nvSpPr>
+          <p:cNvPr id="81" name="Rectangle 65"/>
+          <p:cNvSpPr/>
+          <p:nvPr/>
+        </p:nvSpPr>
+        <p:spPr>
+          <a:xfrm>
+            <a:off x="533400" y="1676400"/>
+            <a:ext cx="7252956" cy="4572000"/>
+          </a:xfrm>
+          <a:prstGeom prst="roundRect">
+            <a:avLst>
+              <a:gd name="adj" fmla="val 3484"/>
+            </a:avLst>
+          </a:prstGeom>
+          <a:solidFill>
+            <a:schemeClr val="accent1">
+              <a:lumMod val="20000"/>
+              <a:lumOff val="80000"/>
+            </a:schemeClr>
+          </a:solidFill>
+          <a:ln w="19050">
+            <a:noFill/>
+          </a:ln>
+          <a:effectLst/>
+        </p:spPr>
+        <p:style>
+          <a:lnRef idx="1">
+            <a:schemeClr val="accent2"/>
+          </a:lnRef>
+          <a:fillRef idx="2">
+            <a:schemeClr val="accent2"/>
+          </a:fillRef>
+          <a:effectRef idx="1">
+            <a:schemeClr val="accent2"/>
+          </a:effectRef>
+          <a:fontRef idx="minor">
+            <a:schemeClr val="dk1"/>
+          </a:fontRef>
+        </p:style>
+        <p:txBody>
+          <a:bodyPr rtlCol="0" anchor="t"/>
+          <a:lstStyle/>
+          <a:p>
+            <a:r>
+              <a:rPr lang="en-US" sz="1200" b="1" dirty="0">
+                <a:solidFill>
+                  <a:srgbClr val="0070C0"/>
+                </a:solidFill>
+              </a:rPr>
+              <a:t>Logic</a:t>
+            </a:r>
+            <a:endParaRPr lang="en-SG" sz="1200" b="1" dirty="0">
+              <a:solidFill>
+                <a:srgbClr val="0070C0"/>
+              </a:solidFill>
+            </a:endParaRPr>
+          </a:p>
+        </p:txBody>
+      </p:sp>
+      <p:sp>
+        <p:nvSpPr>
+          <p:cNvPr id="2" name="Rectangle 62"/>
+          <p:cNvSpPr/>
+          <p:nvPr/>
+        </p:nvSpPr>
+        <p:spPr>
+          <a:xfrm>
+            <a:off x="692646" y="1991746"/>
+            <a:ext cx="1455629" cy="346760"/>
+          </a:xfrm>
+          <a:prstGeom prst="rect">
+            <a:avLst/>
+          </a:prstGeom>
+          <a:solidFill>
+            <a:srgbClr val="0070C0"/>
+          </a:solidFill>
+          <a:ln w="19050">
+            <a:solidFill>
+              <a:srgbClr val="0070C0"/>
+            </a:solidFill>
+          </a:ln>
+          <a:effectLst/>
+        </p:spPr>
+        <p:style>
+          <a:lnRef idx="1">
+            <a:schemeClr val="accent2"/>
+          </a:lnRef>
+          <a:fillRef idx="2">
+            <a:schemeClr val="accent2"/>
+          </a:fillRef>
+          <a:effectRef idx="1">
+            <a:schemeClr val="accent2"/>
+          </a:effectRef>
+          <a:fontRef idx="minor">
+            <a:schemeClr val="dk1"/>
+          </a:fontRef>
+        </p:style>
+        <p:txBody>
+          <a:bodyPr rtlCol="0" anchor="ctr"/>
+          <a:lstStyle/>
+          <a:p>
+            <a:pPr algn="ctr"/>
+            <a:r>
+              <a:rPr lang="en-US" sz="1600" dirty="0">
+                <a:solidFill>
+                  <a:schemeClr val="bg1"/>
+                </a:solidFill>
+              </a:rPr>
+              <a:t>:</a:t>
+            </a:r>
+            <a:r>
+              <a:rPr lang="en-US" sz="1600" dirty="0" err="1">
+                <a:solidFill>
+                  <a:schemeClr val="bg1"/>
+                </a:solidFill>
+              </a:rPr>
+              <a:t>LogicManager</a:t>
+            </a:r>
+            <a:endParaRPr lang="en-SG" sz="1600" dirty="0">
+              <a:solidFill>
+                <a:schemeClr val="bg1"/>
+              </a:solidFill>
+            </a:endParaRPr>
+          </a:p>
+        </p:txBody>
+      </p:sp>
+      <p:cxnSp>
+        <p:nvCxnSpPr>
+          <p:cNvPr id="5" name="Straight Connector 4"/>
+          <p:cNvCxnSpPr/>
+          <p:nvPr/>
+        </p:nvCxnSpPr>
+        <p:spPr>
+          <a:xfrm>
+            <a:off x="1420459" y="2355418"/>
+            <a:ext cx="0" cy="2597583"/>
+          </a:xfrm>
+          <a:prstGeom prst="line">
+            <a:avLst/>
+          </a:prstGeom>
+          <a:ln w="19050">
+            <a:solidFill>
+              <a:srgbClr val="0070C0"/>
+            </a:solidFill>
+            <a:prstDash val="sysDash"/>
+          </a:ln>
+          <a:effectLst/>
+        </p:spPr>
+        <p:style>
+          <a:lnRef idx="1">
+            <a:schemeClr val="accent1"/>
+          </a:lnRef>
+          <a:fillRef idx="2">
+            <a:schemeClr val="accent1"/>
+          </a:fillRef>
+          <a:effectRef idx="1">
+            <a:schemeClr val="accent1"/>
+          </a:effectRef>
+          <a:fontRef idx="minor">
+            <a:schemeClr val="dk1"/>
+          </a:fontRef>
+        </p:style>
+      </p:cxnSp>
+      <p:sp>
+        <p:nvSpPr>
+          <p:cNvPr id="6" name="Rectangle 5"/>
+          <p:cNvSpPr/>
+          <p:nvPr/>
+        </p:nvSpPr>
+        <p:spPr>
+          <a:xfrm>
+            <a:off x="1348452" y="2706112"/>
+            <a:ext cx="124558" cy="3313688"/>
+          </a:xfrm>
+          <a:prstGeom prst="rect">
+            <a:avLst/>
+          </a:prstGeom>
+          <a:solidFill>
+            <a:srgbClr val="0070C0"/>
+          </a:solidFill>
+          <a:ln>
+            <a:solidFill>
+              <a:srgbClr val="0070C0"/>
+            </a:solidFill>
+          </a:ln>
+          <a:effectLst/>
+        </p:spPr>
+        <p:style>
+          <a:lnRef idx="1">
+            <a:schemeClr val="accent3"/>
+          </a:lnRef>
+          <a:fillRef idx="2">
+            <a:schemeClr val="accent3"/>
+          </a:fillRef>
+          <a:effectRef idx="1">
+            <a:schemeClr val="accent3"/>
+          </a:effectRef>
+          <a:fontRef idx="minor">
+            <a:schemeClr val="dk1"/>
+          </a:fontRef>
+        </p:style>
+        <p:txBody>
+          <a:bodyPr rtlCol="0" anchor="ctr"/>
+          <a:lstStyle/>
+          <a:p>
+            <a:pPr algn="ctr"/>
+            <a:endParaRPr lang="en-SG" sz="1400"/>
+          </a:p>
+        </p:txBody>
+      </p:sp>
+      <p:sp>
+        <p:nvSpPr>
+          <p:cNvPr id="16" name="Rectangle 62"/>
+          <p:cNvSpPr/>
+          <p:nvPr/>
+        </p:nvSpPr>
+        <p:spPr>
+          <a:xfrm>
+            <a:off x="2590800" y="1874509"/>
+            <a:ext cx="1447800" cy="467684"/>
+          </a:xfrm>
+          <a:prstGeom prst="rect">
+            <a:avLst/>
+          </a:prstGeom>
+          <a:solidFill>
+            <a:srgbClr val="0070C0"/>
+          </a:solidFill>
+          <a:ln w="19050">
+            <a:solidFill>
+              <a:srgbClr val="0070C0"/>
+            </a:solidFill>
+          </a:ln>
+          <a:effectLst/>
+        </p:spPr>
+        <p:style>
+          <a:lnRef idx="1">
+            <a:schemeClr val="accent2"/>
+          </a:lnRef>
+          <a:fillRef idx="2">
+            <a:schemeClr val="accent2"/>
+          </a:fillRef>
+          <a:effectRef idx="1">
+            <a:schemeClr val="accent2"/>
+          </a:effectRef>
+          <a:fontRef idx="minor">
+            <a:schemeClr val="dk1"/>
+          </a:fontRef>
+        </p:style>
+        <p:txBody>
+          <a:bodyPr rtlCol="0" anchor="ctr"/>
+          <a:lstStyle/>
+          <a:p>
+            <a:pPr algn="ctr"/>
+            <a:r>
+              <a:rPr lang="en-US" sz="1600" dirty="0">
+                <a:solidFill>
+                  <a:schemeClr val="bg1"/>
+                </a:solidFill>
+              </a:rPr>
+              <a:t>:</a:t>
+            </a:r>
+            <a:r>
+              <a:rPr lang="en-US" sz="1600" dirty="0" err="1">
+                <a:solidFill>
+                  <a:schemeClr val="bg1"/>
+                </a:solidFill>
+              </a:rPr>
+              <a:t>InvestigapptorParser</a:t>
+            </a:r>
+            <a:endParaRPr lang="en-SG" sz="1600" dirty="0">
+              <a:solidFill>
+                <a:schemeClr val="bg1"/>
+              </a:solidFill>
+            </a:endParaRPr>
+          </a:p>
+        </p:txBody>
+      </p:sp>
+      <p:cxnSp>
+        <p:nvCxnSpPr>
+          <p:cNvPr id="17" name="Straight Connector 16"/>
+          <p:cNvCxnSpPr/>
+          <p:nvPr/>
+        </p:nvCxnSpPr>
+        <p:spPr>
+          <a:xfrm>
+            <a:off x="3204199" y="2359104"/>
+            <a:ext cx="0" cy="1695374"/>
+          </a:xfrm>
+          <a:prstGeom prst="line">
+            <a:avLst/>
+          </a:prstGeom>
+          <a:ln w="19050">
+            <a:solidFill>
+              <a:srgbClr val="0070C0"/>
+            </a:solidFill>
+            <a:prstDash val="sysDash"/>
+          </a:ln>
+          <a:effectLst/>
+        </p:spPr>
+        <p:style>
+          <a:lnRef idx="1">
+            <a:schemeClr val="accent1"/>
+          </a:lnRef>
+          <a:fillRef idx="2">
+            <a:schemeClr val="accent1"/>
+          </a:fillRef>
+          <a:effectRef idx="1">
+            <a:schemeClr val="accent1"/>
+          </a:effectRef>
+          <a:fontRef idx="minor">
+            <a:schemeClr val="dk1"/>
+          </a:fontRef>
+        </p:style>
+      </p:cxnSp>
+      <p:sp>
+        <p:nvSpPr>
+          <p:cNvPr id="18" name="Rectangle 17"/>
+          <p:cNvSpPr/>
+          <p:nvPr/>
+        </p:nvSpPr>
+        <p:spPr>
+          <a:xfrm>
+            <a:off x="3132191" y="2817297"/>
+            <a:ext cx="174929" cy="1129459"/>
+          </a:xfrm>
+          <a:prstGeom prst="rect">
+            <a:avLst/>
+          </a:prstGeom>
+          <a:solidFill>
+            <a:srgbClr val="0070C0"/>
+          </a:solidFill>
+          <a:ln>
+            <a:solidFill>
+              <a:srgbClr val="0070C0"/>
+            </a:solidFill>
+          </a:ln>
+          <a:effectLst/>
+        </p:spPr>
+        <p:style>
+          <a:lnRef idx="1">
+            <a:schemeClr val="accent3"/>
+          </a:lnRef>
+          <a:fillRef idx="2">
+            <a:schemeClr val="accent3"/>
+          </a:fillRef>
+          <a:effectRef idx="1">
+            <a:schemeClr val="accent3"/>
+          </a:effectRef>
+          <a:fontRef idx="minor">
+            <a:schemeClr val="dk1"/>
+          </a:fontRef>
+        </p:style>
+        <p:txBody>
+          <a:bodyPr rtlCol="0" anchor="ctr"/>
+          <a:lstStyle/>
+          <a:p>
+            <a:pPr algn="ctr"/>
+            <a:endParaRPr lang="en-SG" sz="1400"/>
+          </a:p>
+        </p:txBody>
+      </p:sp>
+      <p:sp>
+        <p:nvSpPr>
+          <p:cNvPr id="19" name="Rectangle 62"/>
+          <p:cNvSpPr/>
+          <p:nvPr/>
+        </p:nvSpPr>
+        <p:spPr>
+          <a:xfrm>
+            <a:off x="6019801" y="3007940"/>
+            <a:ext cx="1398435" cy="461538"/>
+          </a:xfrm>
+          <a:prstGeom prst="rect">
+            <a:avLst/>
+          </a:prstGeom>
+          <a:solidFill>
+            <a:srgbClr val="0070C0"/>
+          </a:solidFill>
+          <a:ln w="19050">
+            <a:solidFill>
+              <a:srgbClr val="0070C0"/>
+            </a:solidFill>
+          </a:ln>
+          <a:effectLst/>
+        </p:spPr>
+        <p:style>
+          <a:lnRef idx="1">
+            <a:schemeClr val="accent2"/>
+          </a:lnRef>
+          <a:fillRef idx="2">
+            <a:schemeClr val="accent2"/>
+          </a:fillRef>
+          <a:effectRef idx="1">
+            <a:schemeClr val="accent2"/>
+          </a:effectRef>
+          <a:fontRef idx="minor">
+            <a:schemeClr val="dk1"/>
+          </a:fontRef>
+        </p:style>
+        <p:txBody>
+          <a:bodyPr rtlCol="0" anchor="ctr"/>
+          <a:lstStyle/>
+          <a:p>
+            <a:pPr algn="ctr"/>
+            <a:r>
+              <a:rPr lang="en-US" sz="1600" dirty="0">
+                <a:solidFill>
+                  <a:schemeClr val="bg1"/>
+                </a:solidFill>
+              </a:rPr>
+              <a:t>d:DeleteCase</a:t>
+            </a:r>
+            <a:br>
+              <a:rPr lang="en-US" sz="1600" dirty="0">
+                <a:solidFill>
+                  <a:schemeClr val="bg1"/>
+                </a:solidFill>
+              </a:rPr>
+            </a:br>
+            <a:r>
+              <a:rPr lang="en-US" sz="1600" dirty="0">
+                <a:solidFill>
+                  <a:schemeClr val="bg1"/>
+                </a:solidFill>
+              </a:rPr>
+              <a:t>Command</a:t>
+            </a:r>
+            <a:endParaRPr lang="en-SG" sz="1600" dirty="0">
+              <a:solidFill>
+                <a:schemeClr val="bg1"/>
+              </a:solidFill>
+            </a:endParaRPr>
+          </a:p>
+        </p:txBody>
+      </p:sp>
+      <p:cxnSp>
+        <p:nvCxnSpPr>
+          <p:cNvPr id="20" name="Straight Connector 19"/>
+          <p:cNvCxnSpPr>
+            <a:stCxn id="21" idx="0"/>
+          </p:cNvCxnSpPr>
+          <p:nvPr/>
+        </p:nvCxnSpPr>
+        <p:spPr>
+          <a:xfrm>
+            <a:off x="6620174" y="3469479"/>
+            <a:ext cx="0" cy="2550321"/>
+          </a:xfrm>
+          <a:prstGeom prst="line">
+            <a:avLst/>
+          </a:prstGeom>
+          <a:ln w="19050">
+            <a:solidFill>
+              <a:srgbClr val="0070C0"/>
+            </a:solidFill>
+            <a:prstDash val="sysDash"/>
+          </a:ln>
+          <a:effectLst/>
+        </p:spPr>
+        <p:style>
+          <a:lnRef idx="1">
+            <a:schemeClr val="accent1"/>
+          </a:lnRef>
+          <a:fillRef idx="2">
+            <a:schemeClr val="accent1"/>
+          </a:fillRef>
+          <a:effectRef idx="1">
+            <a:schemeClr val="accent1"/>
+          </a:effectRef>
+          <a:fontRef idx="minor">
+            <a:schemeClr val="dk1"/>
+          </a:fontRef>
+        </p:style>
+      </p:cxnSp>
+      <p:sp>
+        <p:nvSpPr>
+          <p:cNvPr id="21" name="Rectangle 20"/>
+          <p:cNvSpPr/>
+          <p:nvPr/>
+        </p:nvSpPr>
+        <p:spPr>
+          <a:xfrm>
+            <a:off x="6543974" y="3469479"/>
+            <a:ext cx="152400" cy="276003"/>
+          </a:xfrm>
+          <a:prstGeom prst="rect">
+            <a:avLst/>
+          </a:prstGeom>
+          <a:solidFill>
+            <a:srgbClr val="0070C0"/>
+          </a:solidFill>
+          <a:ln>
+            <a:solidFill>
+              <a:srgbClr val="0070C0"/>
+            </a:solidFill>
+          </a:ln>
+          <a:effectLst/>
+        </p:spPr>
+        <p:style>
+          <a:lnRef idx="1">
+            <a:schemeClr val="accent3"/>
+          </a:lnRef>
+          <a:fillRef idx="2">
+            <a:schemeClr val="accent3"/>
+          </a:fillRef>
+          <a:effectRef idx="1">
+            <a:schemeClr val="accent3"/>
+          </a:effectRef>
+          <a:fontRef idx="minor">
+            <a:schemeClr val="dk1"/>
+          </a:fontRef>
+        </p:style>
+        <p:txBody>
+          <a:bodyPr rtlCol="0" anchor="ctr"/>
+          <a:lstStyle/>
+          <a:p>
+            <a:pPr algn="ctr"/>
+            <a:endParaRPr lang="en-SG" sz="1400"/>
+          </a:p>
+        </p:txBody>
+      </p:sp>
+      <p:cxnSp>
+        <p:nvCxnSpPr>
+          <p:cNvPr id="23" name="Straight Arrow Connector 22"/>
+          <p:cNvCxnSpPr/>
+          <p:nvPr/>
+        </p:nvCxnSpPr>
+        <p:spPr>
+          <a:xfrm>
+            <a:off x="228601" y="2709799"/>
+            <a:ext cx="1119851" cy="0"/>
+          </a:xfrm>
+          <a:prstGeom prst="straightConnector1">
+            <a:avLst/>
+          </a:prstGeom>
+          <a:ln w="19050">
+            <a:solidFill>
+              <a:srgbClr val="00B050"/>
+            </a:solidFill>
+            <a:tailEnd type="arrow"/>
+          </a:ln>
+        </p:spPr>
+        <p:style>
+          <a:lnRef idx="1">
+            <a:schemeClr val="accent1"/>
+          </a:lnRef>
+          <a:fillRef idx="0">
+            <a:schemeClr val="accent1"/>
+          </a:fillRef>
+          <a:effectRef idx="0">
+            <a:schemeClr val="accent1"/>
+          </a:effectRef>
+          <a:fontRef idx="minor">
+            <a:schemeClr val="tx1"/>
+          </a:fontRef>
+        </p:style>
+      </p:cxnSp>
+      <p:cxnSp>
+        <p:nvCxnSpPr>
+          <p:cNvPr id="25" name="Straight Arrow Connector 24"/>
+          <p:cNvCxnSpPr/>
+          <p:nvPr/>
+        </p:nvCxnSpPr>
+        <p:spPr>
+          <a:xfrm flipV="1">
+            <a:off x="1500851" y="2817298"/>
+            <a:ext cx="1596514" cy="1"/>
+          </a:xfrm>
+          <a:prstGeom prst="straightConnector1">
+            <a:avLst/>
+          </a:prstGeom>
+          <a:ln w="19050">
+            <a:solidFill>
+              <a:srgbClr val="0070C0"/>
+            </a:solidFill>
+            <a:tailEnd type="arrow"/>
+          </a:ln>
+        </p:spPr>
+        <p:style>
+          <a:lnRef idx="1">
+            <a:schemeClr val="accent1"/>
+          </a:lnRef>
+          <a:fillRef idx="0">
+            <a:schemeClr val="accent1"/>
+          </a:fillRef>
+          <a:effectRef idx="0">
+            <a:schemeClr val="accent1"/>
+          </a:effectRef>
+          <a:fontRef idx="minor">
+            <a:schemeClr val="tx1"/>
+          </a:fontRef>
+        </p:style>
+      </p:cxnSp>
+      <p:sp>
+        <p:nvSpPr>
+          <p:cNvPr id="26" name="TextBox 25"/>
+          <p:cNvSpPr txBox="1"/>
+          <p:nvPr/>
+        </p:nvSpPr>
+        <p:spPr>
+          <a:xfrm>
+            <a:off x="1136178" y="2788977"/>
+            <a:ext cx="1905000" cy="184666"/>
+          </a:xfrm>
+          <a:prstGeom prst="rect">
+            <a:avLst/>
+          </a:prstGeom>
+          <a:noFill/>
+        </p:spPr>
+        <p:txBody>
+          <a:bodyPr wrap="square" lIns="0" tIns="0" rIns="0" bIns="0" rtlCol="0">
+            <a:spAutoFit/>
+          </a:bodyPr>
+          <a:lstStyle/>
+          <a:p>
+            <a:pPr algn="r"/>
+            <a:r>
+              <a:rPr lang="en-US" sz="1200" dirty="0">
+                <a:solidFill>
+                  <a:srgbClr val="0070C0"/>
+                </a:solidFill>
+              </a:rPr>
+              <a:t>execute(“</a:t>
+            </a:r>
+            <a:r>
+              <a:rPr lang="en-US" sz="1200" dirty="0" err="1">
+                <a:solidFill>
+                  <a:srgbClr val="0070C0"/>
+                </a:solidFill>
+              </a:rPr>
+              <a:t>deleteCase</a:t>
+            </a:r>
+            <a:r>
+              <a:rPr lang="en-US" sz="1200" dirty="0">
+                <a:solidFill>
+                  <a:srgbClr val="0070C0"/>
+                </a:solidFill>
+              </a:rPr>
+              <a:t> 1”)</a:t>
+            </a:r>
+          </a:p>
+        </p:txBody>
+      </p:sp>
+      <p:cxnSp>
+        <p:nvCxnSpPr>
+          <p:cNvPr id="28" name="Straight Arrow Connector 27"/>
+          <p:cNvCxnSpPr/>
+          <p:nvPr/>
+        </p:nvCxnSpPr>
+        <p:spPr>
+          <a:xfrm flipV="1">
+            <a:off x="5104818" y="3398415"/>
+            <a:ext cx="922392" cy="1"/>
+          </a:xfrm>
+          <a:prstGeom prst="straightConnector1">
+            <a:avLst/>
+          </a:prstGeom>
+          <a:ln w="19050">
+            <a:solidFill>
+              <a:srgbClr val="0070C0"/>
+            </a:solidFill>
+            <a:tailEnd type="arrow"/>
+          </a:ln>
+        </p:spPr>
+        <p:style>
+          <a:lnRef idx="1">
+            <a:schemeClr val="accent1"/>
+          </a:lnRef>
+          <a:fillRef idx="0">
+            <a:schemeClr val="accent1"/>
+          </a:fillRef>
+          <a:effectRef idx="0">
+            <a:schemeClr val="accent1"/>
+          </a:effectRef>
+          <a:fontRef idx="minor">
+            <a:schemeClr val="tx1"/>
+          </a:fontRef>
+        </p:style>
+      </p:cxnSp>
+      <p:sp>
+        <p:nvSpPr>
+          <p:cNvPr id="29" name="TextBox 28"/>
+          <p:cNvSpPr txBox="1"/>
+          <p:nvPr/>
+        </p:nvSpPr>
+        <p:spPr>
+          <a:xfrm>
+            <a:off x="4105183" y="3946756"/>
+            <a:ext cx="855809" cy="215444"/>
+          </a:xfrm>
+          <a:prstGeom prst="rect">
+            <a:avLst/>
+          </a:prstGeom>
+          <a:noFill/>
+        </p:spPr>
+        <p:txBody>
+          <a:bodyPr wrap="square" lIns="0" tIns="0" rIns="0" bIns="0" rtlCol="0">
+            <a:spAutoFit/>
+          </a:bodyPr>
+          <a:lstStyle>
+            <a:defPPr>
+              <a:defRPr lang="en-US"/>
+            </a:defPPr>
+            <a:lvl1pPr algn="r">
+              <a:defRPr sz="1400">
+                <a:solidFill>
+                  <a:srgbClr val="0070C0"/>
+                </a:solidFill>
+              </a:defRPr>
+            </a:lvl1pPr>
+          </a:lstStyle>
+          <a:p>
+            <a:r>
+              <a:rPr lang="en-US" dirty="0"/>
+              <a:t>execute()</a:t>
+            </a:r>
+          </a:p>
+        </p:txBody>
+      </p:sp>
+      <p:cxnSp>
+        <p:nvCxnSpPr>
+          <p:cNvPr id="34" name="Straight Arrow Connector 33"/>
+          <p:cNvCxnSpPr/>
+          <p:nvPr/>
+        </p:nvCxnSpPr>
+        <p:spPr>
+          <a:xfrm>
+            <a:off x="5105400" y="3745481"/>
+            <a:ext cx="1492974" cy="0"/>
+          </a:xfrm>
+          <a:prstGeom prst="straightConnector1">
+            <a:avLst/>
+          </a:prstGeom>
+          <a:ln w="19050">
+            <a:solidFill>
+              <a:srgbClr val="0070C0"/>
+            </a:solidFill>
+            <a:prstDash val="sysDash"/>
+            <a:headEnd type="arrow" w="med" len="med"/>
+            <a:tailEnd type="none" w="med" len="med"/>
+          </a:ln>
+        </p:spPr>
+        <p:style>
+          <a:lnRef idx="1">
+            <a:schemeClr val="accent1"/>
+          </a:lnRef>
+          <a:fillRef idx="0">
+            <a:schemeClr val="accent1"/>
+          </a:fillRef>
+          <a:effectRef idx="0">
+            <a:schemeClr val="accent1"/>
+          </a:effectRef>
+          <a:fontRef idx="minor">
+            <a:schemeClr val="tx1"/>
+          </a:fontRef>
+        </p:style>
+      </p:cxnSp>
+      <p:cxnSp>
+        <p:nvCxnSpPr>
+          <p:cNvPr id="35" name="Straight Arrow Connector 34"/>
+          <p:cNvCxnSpPr/>
+          <p:nvPr/>
+        </p:nvCxnSpPr>
+        <p:spPr>
+          <a:xfrm flipV="1">
+            <a:off x="1517786" y="3938431"/>
+            <a:ext cx="1596514" cy="5378"/>
+          </a:xfrm>
+          <a:prstGeom prst="straightConnector1">
+            <a:avLst/>
+          </a:prstGeom>
+          <a:ln w="19050">
+            <a:solidFill>
+              <a:srgbClr val="0070C0"/>
+            </a:solidFill>
+            <a:prstDash val="sysDash"/>
+            <a:headEnd type="arrow" w="med" len="med"/>
+            <a:tailEnd type="none" w="med" len="med"/>
+          </a:ln>
+        </p:spPr>
+        <p:style>
+          <a:lnRef idx="1">
+            <a:schemeClr val="accent1"/>
+          </a:lnRef>
+          <a:fillRef idx="0">
+            <a:schemeClr val="accent1"/>
+          </a:fillRef>
+          <a:effectRef idx="0">
+            <a:schemeClr val="accent1"/>
+          </a:effectRef>
+          <a:fontRef idx="minor">
+            <a:schemeClr val="tx1"/>
+          </a:fontRef>
+        </p:style>
+      </p:cxnSp>
+      <p:cxnSp>
+        <p:nvCxnSpPr>
+          <p:cNvPr id="37" name="Straight Arrow Connector 36"/>
+          <p:cNvCxnSpPr/>
+          <p:nvPr/>
+        </p:nvCxnSpPr>
+        <p:spPr>
+          <a:xfrm>
+            <a:off x="152400" y="6000065"/>
+            <a:ext cx="1196051" cy="0"/>
+          </a:xfrm>
+          <a:prstGeom prst="straightConnector1">
+            <a:avLst/>
+          </a:prstGeom>
+          <a:ln w="19050">
+            <a:solidFill>
+              <a:schemeClr val="accent1"/>
+            </a:solidFill>
+            <a:prstDash val="sysDash"/>
+            <a:headEnd type="arrow" w="med" len="med"/>
+            <a:tailEnd type="none" w="med" len="med"/>
+          </a:ln>
+        </p:spPr>
+        <p:style>
+          <a:lnRef idx="1">
+            <a:schemeClr val="accent1"/>
+          </a:lnRef>
+          <a:fillRef idx="0">
+            <a:schemeClr val="accent1"/>
+          </a:fillRef>
+          <a:effectRef idx="0">
+            <a:schemeClr val="accent1"/>
+          </a:effectRef>
+          <a:fontRef idx="minor">
+            <a:schemeClr val="tx1"/>
+          </a:fontRef>
+        </p:style>
+      </p:cxnSp>
+      <p:sp>
+        <p:nvSpPr>
+          <p:cNvPr id="39" name="Rectangle 62"/>
+          <p:cNvSpPr/>
+          <p:nvPr/>
+        </p:nvSpPr>
+        <p:spPr>
+          <a:xfrm>
+            <a:off x="8413797" y="2057400"/>
+            <a:ext cx="1030504" cy="346760"/>
+          </a:xfrm>
+          <a:prstGeom prst="rect">
+            <a:avLst/>
+          </a:prstGeom>
+          <a:solidFill>
+            <a:schemeClr val="accent4">
+              <a:lumMod val="60000"/>
+              <a:lumOff val="40000"/>
+            </a:schemeClr>
+          </a:solidFill>
+          <a:ln w="19050">
+            <a:solidFill>
+              <a:schemeClr val="accent4">
+                <a:lumMod val="60000"/>
+                <a:lumOff val="40000"/>
+              </a:schemeClr>
+            </a:solidFill>
+          </a:ln>
+          <a:effectLst/>
+        </p:spPr>
+        <p:style>
+          <a:lnRef idx="1">
+            <a:schemeClr val="accent2"/>
+          </a:lnRef>
+          <a:fillRef idx="2">
+            <a:schemeClr val="accent2"/>
+          </a:fillRef>
+          <a:effectRef idx="1">
+            <a:schemeClr val="accent2"/>
+          </a:effectRef>
+          <a:fontRef idx="minor">
+            <a:schemeClr val="dk1"/>
+          </a:fontRef>
+        </p:style>
+        <p:txBody>
+          <a:bodyPr rtlCol="0" anchor="ctr"/>
+          <a:lstStyle/>
+          <a:p>
+            <a:pPr algn="ctr"/>
+            <a:r>
+              <a:rPr lang="en-US" sz="1600" dirty="0">
+                <a:solidFill>
+                  <a:schemeClr val="bg1"/>
+                </a:solidFill>
+              </a:rPr>
+              <a:t>:Model</a:t>
+            </a:r>
+            <a:endParaRPr lang="en-SG" sz="1600" dirty="0">
+              <a:solidFill>
+                <a:schemeClr val="bg1"/>
+              </a:solidFill>
+            </a:endParaRPr>
+          </a:p>
+        </p:txBody>
+      </p:sp>
+      <p:cxnSp>
+        <p:nvCxnSpPr>
+          <p:cNvPr id="64" name="Straight Arrow Connector 63"/>
+          <p:cNvCxnSpPr/>
+          <p:nvPr/>
+        </p:nvCxnSpPr>
+        <p:spPr>
+          <a:xfrm>
+            <a:off x="1500852" y="4190517"/>
+            <a:ext cx="5043123" cy="0"/>
+          </a:xfrm>
+          <a:prstGeom prst="straightConnector1">
+            <a:avLst/>
+          </a:prstGeom>
+          <a:ln w="19050">
+            <a:solidFill>
+              <a:srgbClr val="0070C0"/>
+            </a:solidFill>
+            <a:tailEnd type="arrow"/>
+          </a:ln>
+        </p:spPr>
+        <p:style>
+          <a:lnRef idx="1">
+            <a:schemeClr val="accent1"/>
+          </a:lnRef>
+          <a:fillRef idx="0">
+            <a:schemeClr val="accent1"/>
+          </a:fillRef>
+          <a:effectRef idx="0">
+            <a:schemeClr val="accent1"/>
+          </a:effectRef>
+          <a:fontRef idx="minor">
+            <a:schemeClr val="tx1"/>
+          </a:fontRef>
+        </p:style>
+      </p:cxnSp>
+      <p:sp>
+        <p:nvSpPr>
+          <p:cNvPr id="65" name="Rectangle 64"/>
+          <p:cNvSpPr/>
+          <p:nvPr/>
+        </p:nvSpPr>
+        <p:spPr>
+          <a:xfrm>
+            <a:off x="6535052" y="4162200"/>
+            <a:ext cx="144008" cy="1629000"/>
+          </a:xfrm>
+          <a:prstGeom prst="rect">
+            <a:avLst/>
+          </a:prstGeom>
+          <a:solidFill>
+            <a:srgbClr val="0070C0"/>
+          </a:solidFill>
+          <a:ln>
+            <a:solidFill>
+              <a:srgbClr val="0070C0"/>
+            </a:solidFill>
+          </a:ln>
+          <a:effectLst/>
+        </p:spPr>
+        <p:style>
+          <a:lnRef idx="1">
+            <a:schemeClr val="accent3"/>
+          </a:lnRef>
+          <a:fillRef idx="2">
+            <a:schemeClr val="accent3"/>
+          </a:fillRef>
+          <a:effectRef idx="1">
+            <a:schemeClr val="accent3"/>
+          </a:effectRef>
+          <a:fontRef idx="minor">
+            <a:schemeClr val="dk1"/>
+          </a:fontRef>
+        </p:style>
+        <p:txBody>
+          <a:bodyPr rtlCol="0" anchor="ctr"/>
+          <a:lstStyle/>
+          <a:p>
+            <a:pPr algn="ctr"/>
+            <a:endParaRPr lang="en-SG" sz="1400"/>
+          </a:p>
+        </p:txBody>
+      </p:sp>
+      <p:cxnSp>
+        <p:nvCxnSpPr>
+          <p:cNvPr id="71" name="Straight Connector 70"/>
+          <p:cNvCxnSpPr/>
+          <p:nvPr/>
+        </p:nvCxnSpPr>
+        <p:spPr>
+          <a:xfrm>
+            <a:off x="8929049" y="2396058"/>
+            <a:ext cx="0" cy="3623742"/>
+          </a:xfrm>
+          <a:prstGeom prst="line">
+            <a:avLst/>
+          </a:prstGeom>
+          <a:ln w="19050">
+            <a:solidFill>
+              <a:schemeClr val="accent4">
+                <a:lumMod val="60000"/>
+                <a:lumOff val="40000"/>
+              </a:schemeClr>
+            </a:solidFill>
+            <a:prstDash val="sysDash"/>
+          </a:ln>
+          <a:effectLst/>
+        </p:spPr>
+        <p:style>
+          <a:lnRef idx="1">
+            <a:schemeClr val="accent1"/>
+          </a:lnRef>
+          <a:fillRef idx="2">
+            <a:schemeClr val="accent1"/>
+          </a:fillRef>
+          <a:effectRef idx="1">
+            <a:schemeClr val="accent1"/>
+          </a:effectRef>
+          <a:fontRef idx="minor">
+            <a:schemeClr val="dk1"/>
+          </a:fontRef>
+        </p:style>
+      </p:cxnSp>
+      <p:sp>
+        <p:nvSpPr>
+          <p:cNvPr id="73" name="Rectangle 72"/>
+          <p:cNvSpPr/>
+          <p:nvPr/>
+        </p:nvSpPr>
+        <p:spPr>
+          <a:xfrm>
+            <a:off x="8834701" y="4219798"/>
+            <a:ext cx="152400" cy="199803"/>
+          </a:xfrm>
+          <a:prstGeom prst="rect">
+            <a:avLst/>
+          </a:prstGeom>
+          <a:solidFill>
+            <a:schemeClr val="accent4">
+              <a:lumMod val="60000"/>
+              <a:lumOff val="40000"/>
+            </a:schemeClr>
+          </a:solidFill>
+          <a:ln>
+            <a:solidFill>
+              <a:schemeClr val="accent4">
+                <a:lumMod val="60000"/>
+                <a:lumOff val="40000"/>
+              </a:schemeClr>
+            </a:solidFill>
+          </a:ln>
+          <a:effectLst/>
+        </p:spPr>
+        <p:style>
+          <a:lnRef idx="1">
+            <a:schemeClr val="accent3"/>
+          </a:lnRef>
+          <a:fillRef idx="2">
+            <a:schemeClr val="accent3"/>
+          </a:fillRef>
+          <a:effectRef idx="1">
+            <a:schemeClr val="accent3"/>
+          </a:effectRef>
+          <a:fontRef idx="minor">
+            <a:schemeClr val="dk1"/>
+          </a:fontRef>
+        </p:style>
+        <p:txBody>
+          <a:bodyPr rtlCol="0" anchor="ctr"/>
+          <a:lstStyle/>
+          <a:p>
+            <a:pPr algn="ctr"/>
+            <a:endParaRPr lang="en-SG" sz="1400"/>
+          </a:p>
+        </p:txBody>
+      </p:sp>
+      <p:cxnSp>
+        <p:nvCxnSpPr>
+          <p:cNvPr id="75" name="Straight Arrow Connector 74"/>
+          <p:cNvCxnSpPr/>
+          <p:nvPr/>
+        </p:nvCxnSpPr>
+        <p:spPr>
+          <a:xfrm>
+            <a:off x="6629400" y="4219797"/>
+            <a:ext cx="2212637" cy="1"/>
+          </a:xfrm>
+          <a:prstGeom prst="straightConnector1">
+            <a:avLst/>
+          </a:prstGeom>
+          <a:ln w="19050">
+            <a:solidFill>
+              <a:srgbClr val="0070C0"/>
+            </a:solidFill>
+            <a:tailEnd type="arrow"/>
+          </a:ln>
+        </p:spPr>
+        <p:style>
+          <a:lnRef idx="1">
+            <a:schemeClr val="accent1"/>
+          </a:lnRef>
+          <a:fillRef idx="0">
+            <a:schemeClr val="accent1"/>
+          </a:fillRef>
+          <a:effectRef idx="0">
+            <a:schemeClr val="accent1"/>
+          </a:effectRef>
+          <a:fontRef idx="minor">
+            <a:schemeClr val="tx1"/>
+          </a:fontRef>
+        </p:style>
+      </p:cxnSp>
+      <p:cxnSp>
+        <p:nvCxnSpPr>
+          <p:cNvPr id="76" name="Straight Arrow Connector 75"/>
+          <p:cNvCxnSpPr>
+            <a:endCxn id="73" idx="2"/>
+          </p:cNvCxnSpPr>
+          <p:nvPr/>
+        </p:nvCxnSpPr>
+        <p:spPr>
+          <a:xfrm>
+            <a:off x="6705600" y="4419601"/>
+            <a:ext cx="2205301" cy="0"/>
+          </a:xfrm>
+          <a:prstGeom prst="straightConnector1">
+            <a:avLst/>
+          </a:prstGeom>
+          <a:ln w="19050">
+            <a:solidFill>
+              <a:schemeClr val="accent4">
+                <a:lumMod val="60000"/>
+                <a:lumOff val="40000"/>
+              </a:schemeClr>
+            </a:solidFill>
+            <a:prstDash val="sysDash"/>
+            <a:headEnd type="arrow" w="med" len="med"/>
+            <a:tailEnd type="none" w="med" len="med"/>
+          </a:ln>
+        </p:spPr>
+        <p:style>
+          <a:lnRef idx="1">
+            <a:schemeClr val="accent1"/>
+          </a:lnRef>
+          <a:fillRef idx="0">
+            <a:schemeClr val="accent1"/>
+          </a:fillRef>
+          <a:effectRef idx="0">
+            <a:schemeClr val="accent1"/>
+          </a:effectRef>
+          <a:fontRef idx="minor">
+            <a:schemeClr val="tx1"/>
+          </a:fontRef>
+        </p:style>
+      </p:cxnSp>
+      <p:cxnSp>
+        <p:nvCxnSpPr>
+          <p:cNvPr id="77" name="Straight Arrow Connector 76"/>
+          <p:cNvCxnSpPr/>
+          <p:nvPr/>
+        </p:nvCxnSpPr>
+        <p:spPr>
+          <a:xfrm>
+            <a:off x="1500851" y="5791200"/>
+            <a:ext cx="5052349" cy="0"/>
+          </a:xfrm>
+          <a:prstGeom prst="straightConnector1">
+            <a:avLst/>
+          </a:prstGeom>
+          <a:ln w="19050">
+            <a:solidFill>
+              <a:srgbClr val="0070C0"/>
+            </a:solidFill>
+            <a:prstDash val="sysDash"/>
+            <a:headEnd type="arrow" w="med" len="med"/>
+            <a:tailEnd type="none" w="med" len="med"/>
+          </a:ln>
+        </p:spPr>
+        <p:style>
+          <a:lnRef idx="1">
+            <a:schemeClr val="accent1"/>
+          </a:lnRef>
+          <a:fillRef idx="0">
+            <a:schemeClr val="accent1"/>
+          </a:fillRef>
+          <a:effectRef idx="0">
+            <a:schemeClr val="accent1"/>
+          </a:effectRef>
+          <a:fontRef idx="minor">
+            <a:schemeClr val="tx1"/>
+          </a:fontRef>
+        </p:style>
+      </p:cxnSp>
+      <p:sp>
+        <p:nvSpPr>
+          <p:cNvPr id="78" name="TextBox 77"/>
+          <p:cNvSpPr txBox="1"/>
+          <p:nvPr/>
+        </p:nvSpPr>
+        <p:spPr>
+          <a:xfrm>
+            <a:off x="7250253" y="3946756"/>
+            <a:ext cx="1589916" cy="215444"/>
+          </a:xfrm>
+          <a:prstGeom prst="rect">
+            <a:avLst/>
+          </a:prstGeom>
+          <a:noFill/>
+        </p:spPr>
+        <p:txBody>
+          <a:bodyPr wrap="square" lIns="0" tIns="0" rIns="0" bIns="0" rtlCol="0">
+            <a:spAutoFit/>
+          </a:bodyPr>
+          <a:lstStyle>
+            <a:defPPr>
+              <a:defRPr lang="en-US"/>
+            </a:defPPr>
+            <a:lvl1pPr algn="r">
+              <a:defRPr sz="1400">
+                <a:solidFill>
+                  <a:srgbClr val="0070C0"/>
+                </a:solidFill>
+              </a:defRPr>
+            </a:lvl1pPr>
+          </a:lstStyle>
+          <a:p>
+            <a:r>
+              <a:rPr lang="en-US" dirty="0" err="1">
+                <a:solidFill>
+                  <a:srgbClr val="7030A0"/>
+                </a:solidFill>
+              </a:rPr>
+              <a:t>deleteCrimeCase</a:t>
+            </a:r>
+            <a:r>
+              <a:rPr lang="en-US" dirty="0">
+                <a:solidFill>
+                  <a:srgbClr val="7030A0"/>
+                </a:solidFill>
+              </a:rPr>
+              <a:t>(c)</a:t>
+            </a:r>
+          </a:p>
+        </p:txBody>
+      </p:sp>
+      <p:sp>
+        <p:nvSpPr>
+          <p:cNvPr id="79" name="TextBox 78"/>
+          <p:cNvSpPr txBox="1"/>
+          <p:nvPr/>
+        </p:nvSpPr>
+        <p:spPr>
+          <a:xfrm>
+            <a:off x="3695152" y="3352800"/>
+            <a:ext cx="767033" cy="184666"/>
+          </a:xfrm>
+          <a:prstGeom prst="rect">
+            <a:avLst/>
+          </a:prstGeom>
+          <a:noFill/>
+        </p:spPr>
+        <p:txBody>
+          <a:bodyPr wrap="square" lIns="0" tIns="0" rIns="0" bIns="0" rtlCol="0">
+            <a:spAutoFit/>
+          </a:bodyPr>
+          <a:lstStyle>
+            <a:defPPr>
+              <a:defRPr lang="en-US"/>
+            </a:defPPr>
+            <a:lvl1pPr algn="r">
+              <a:defRPr sz="1400">
+                <a:solidFill>
+                  <a:srgbClr val="0070C0"/>
+                </a:solidFill>
+              </a:defRPr>
+            </a:lvl1pPr>
+          </a:lstStyle>
+          <a:p>
+            <a:r>
+              <a:rPr lang="en-US" sz="1200" dirty="0"/>
+              <a:t>parse(“1”)</a:t>
+            </a:r>
+          </a:p>
+        </p:txBody>
+      </p:sp>
+      <p:sp>
+        <p:nvSpPr>
+          <p:cNvPr id="80" name="TextBox 79"/>
+          <p:cNvSpPr txBox="1"/>
+          <p:nvPr/>
+        </p:nvSpPr>
+        <p:spPr>
+          <a:xfrm>
+            <a:off x="1400783" y="2569842"/>
+            <a:ext cx="1716537" cy="184666"/>
+          </a:xfrm>
+          <a:prstGeom prst="rect">
+            <a:avLst/>
+          </a:prstGeom>
+          <a:noFill/>
+        </p:spPr>
+        <p:txBody>
+          <a:bodyPr wrap="square" lIns="0" tIns="0" rIns="0" bIns="0" rtlCol="0">
+            <a:spAutoFit/>
+          </a:bodyPr>
+          <a:lstStyle>
+            <a:defPPr>
+              <a:defRPr lang="en-US"/>
+            </a:defPPr>
+            <a:lvl1pPr algn="r">
+              <a:defRPr sz="1400">
+                <a:solidFill>
+                  <a:srgbClr val="0070C0"/>
+                </a:solidFill>
+              </a:defRPr>
+            </a:lvl1pPr>
+          </a:lstStyle>
+          <a:p>
+            <a:r>
+              <a:rPr lang="en-US" sz="1200" dirty="0"/>
+              <a:t>parse(“</a:t>
+            </a:r>
+            <a:r>
+              <a:rPr lang="en-US" sz="1200" dirty="0" err="1"/>
+              <a:t>deleteCase</a:t>
+            </a:r>
+            <a:r>
+              <a:rPr lang="en-US" sz="1200" dirty="0"/>
+              <a:t> 1”)</a:t>
+            </a:r>
+          </a:p>
+        </p:txBody>
+      </p:sp>
+      <p:sp>
+        <p:nvSpPr>
+          <p:cNvPr id="82" name="TextBox 81"/>
+          <p:cNvSpPr txBox="1"/>
+          <p:nvPr/>
+        </p:nvSpPr>
+        <p:spPr>
+          <a:xfrm>
+            <a:off x="3559376" y="5280674"/>
+            <a:ext cx="621216" cy="215444"/>
+          </a:xfrm>
+          <a:prstGeom prst="rect">
+            <a:avLst/>
+          </a:prstGeom>
+          <a:noFill/>
+        </p:spPr>
+        <p:txBody>
+          <a:bodyPr wrap="square" lIns="0" tIns="0" rIns="0" bIns="0" rtlCol="0">
+            <a:spAutoFit/>
+          </a:bodyPr>
+          <a:lstStyle>
+            <a:defPPr>
+              <a:defRPr lang="en-US"/>
+            </a:defPPr>
+            <a:lvl1pPr algn="r">
+              <a:defRPr sz="1400">
+                <a:solidFill>
+                  <a:srgbClr val="0070C0"/>
+                </a:solidFill>
+              </a:defRPr>
+            </a:lvl1pPr>
+          </a:lstStyle>
+          <a:p>
+            <a:r>
+              <a:rPr lang="en-US" dirty="0" smtClean="0"/>
+              <a:t>r</a:t>
+            </a:r>
+            <a:endParaRPr lang="en-US" dirty="0"/>
+          </a:p>
+        </p:txBody>
+      </p:sp>
+      <p:sp>
+        <p:nvSpPr>
+          <p:cNvPr id="83" name="TextBox 82"/>
+          <p:cNvSpPr txBox="1"/>
+          <p:nvPr/>
+        </p:nvSpPr>
+        <p:spPr>
+          <a:xfrm>
+            <a:off x="441212" y="5715000"/>
+            <a:ext cx="762000" cy="215444"/>
+          </a:xfrm>
+          <a:prstGeom prst="rect">
+            <a:avLst/>
+          </a:prstGeom>
+          <a:noFill/>
+        </p:spPr>
+        <p:txBody>
+          <a:bodyPr wrap="square" lIns="0" tIns="0" rIns="0" bIns="0" rtlCol="0">
+            <a:spAutoFit/>
+          </a:bodyPr>
+          <a:lstStyle>
+            <a:defPPr>
+              <a:defRPr lang="en-US"/>
+            </a:defPPr>
+            <a:lvl1pPr algn="r">
+              <a:defRPr sz="1400">
+                <a:solidFill>
+                  <a:srgbClr val="0070C0"/>
+                </a:solidFill>
+              </a:defRPr>
+            </a:lvl1pPr>
+          </a:lstStyle>
+          <a:p>
+            <a:r>
+              <a:rPr lang="en-US" dirty="0" smtClean="0"/>
+              <a:t>r</a:t>
+            </a:r>
+            <a:endParaRPr lang="en-US" dirty="0"/>
+          </a:p>
+        </p:txBody>
+      </p:sp>
+      <p:sp>
+        <p:nvSpPr>
+          <p:cNvPr id="84" name="Rectangle 62"/>
+          <p:cNvSpPr/>
+          <p:nvPr/>
+        </p:nvSpPr>
+        <p:spPr>
+          <a:xfrm>
+            <a:off x="6867846" y="5181600"/>
+            <a:ext cx="1733561" cy="314621"/>
+          </a:xfrm>
+          <a:prstGeom prst="rect">
+            <a:avLst/>
+          </a:prstGeom>
+          <a:solidFill>
+            <a:srgbClr val="0070C0"/>
+          </a:solidFill>
+          <a:ln w="19050">
+            <a:solidFill>
+              <a:srgbClr val="0070C0"/>
+            </a:solidFill>
+          </a:ln>
+          <a:effectLst/>
+        </p:spPr>
+        <p:style>
+          <a:lnRef idx="1">
+            <a:schemeClr val="accent2"/>
+          </a:lnRef>
+          <a:fillRef idx="2">
+            <a:schemeClr val="accent2"/>
+          </a:fillRef>
+          <a:effectRef idx="1">
+            <a:schemeClr val="accent2"/>
+          </a:effectRef>
+          <a:fontRef idx="minor">
+            <a:schemeClr val="dk1"/>
+          </a:fontRef>
+        </p:style>
+        <p:txBody>
+          <a:bodyPr rtlCol="0" anchor="ctr"/>
+          <a:lstStyle/>
+          <a:p>
+            <a:pPr algn="ctr"/>
+            <a:r>
+              <a:rPr lang="en-US" sz="1600" dirty="0" err="1" smtClean="0">
+                <a:solidFill>
+                  <a:schemeClr val="bg1"/>
+                </a:solidFill>
+              </a:rPr>
+              <a:t>r:CommandResult</a:t>
+            </a:r>
+            <a:endParaRPr lang="en-SG" sz="1600" dirty="0">
+              <a:solidFill>
+                <a:schemeClr val="bg1"/>
+              </a:solidFill>
+            </a:endParaRPr>
+          </a:p>
+        </p:txBody>
+      </p:sp>
+      <p:sp>
+        <p:nvSpPr>
+          <p:cNvPr id="86" name="Rectangle 85"/>
+          <p:cNvSpPr/>
+          <p:nvPr/>
+        </p:nvSpPr>
+        <p:spPr>
+          <a:xfrm>
+            <a:off x="7624923" y="5496222"/>
+            <a:ext cx="152400" cy="171376"/>
+          </a:xfrm>
+          <a:prstGeom prst="rect">
+            <a:avLst/>
+          </a:prstGeom>
+          <a:solidFill>
+            <a:srgbClr val="0070C0"/>
+          </a:solidFill>
+          <a:ln>
+            <a:solidFill>
+              <a:srgbClr val="0070C0"/>
+            </a:solidFill>
+          </a:ln>
+          <a:effectLst/>
+        </p:spPr>
+        <p:style>
+          <a:lnRef idx="1">
+            <a:schemeClr val="accent3"/>
+          </a:lnRef>
+          <a:fillRef idx="2">
+            <a:schemeClr val="accent3"/>
+          </a:fillRef>
+          <a:effectRef idx="1">
+            <a:schemeClr val="accent3"/>
+          </a:effectRef>
+          <a:fontRef idx="minor">
+            <a:schemeClr val="dk1"/>
+          </a:fontRef>
+        </p:style>
+        <p:txBody>
+          <a:bodyPr rtlCol="0" anchor="ctr"/>
+          <a:lstStyle/>
+          <a:p>
+            <a:pPr algn="ctr"/>
+            <a:endParaRPr lang="en-SG" sz="1400"/>
+          </a:p>
+        </p:txBody>
+      </p:sp>
+      <p:cxnSp>
+        <p:nvCxnSpPr>
+          <p:cNvPr id="90" name="Straight Arrow Connector 89"/>
+          <p:cNvCxnSpPr/>
+          <p:nvPr/>
+        </p:nvCxnSpPr>
+        <p:spPr>
+          <a:xfrm>
+            <a:off x="6705600" y="5667598"/>
+            <a:ext cx="966624" cy="0"/>
+          </a:xfrm>
+          <a:prstGeom prst="straightConnector1">
+            <a:avLst/>
+          </a:prstGeom>
+          <a:ln w="19050">
+            <a:solidFill>
+              <a:srgbClr val="0070C0"/>
+            </a:solidFill>
+            <a:prstDash val="sysDash"/>
+            <a:headEnd type="arrow" w="med" len="med"/>
+            <a:tailEnd type="none" w="med" len="med"/>
+          </a:ln>
+        </p:spPr>
+        <p:style>
+          <a:lnRef idx="1">
+            <a:schemeClr val="accent1"/>
+          </a:lnRef>
+          <a:fillRef idx="0">
+            <a:schemeClr val="accent1"/>
+          </a:fillRef>
+          <a:effectRef idx="0">
+            <a:schemeClr val="accent1"/>
+          </a:effectRef>
+          <a:fontRef idx="minor">
+            <a:schemeClr val="tx1"/>
+          </a:fontRef>
+        </p:style>
+      </p:cxnSp>
+      <p:sp>
+        <p:nvSpPr>
+          <p:cNvPr id="93" name="TextBox 92"/>
+          <p:cNvSpPr txBox="1"/>
+          <p:nvPr/>
+        </p:nvSpPr>
+        <p:spPr>
+          <a:xfrm>
+            <a:off x="2521446" y="3722987"/>
+            <a:ext cx="220343" cy="215444"/>
+          </a:xfrm>
+          <a:prstGeom prst="rect">
+            <a:avLst/>
+          </a:prstGeom>
+          <a:noFill/>
+        </p:spPr>
+        <p:txBody>
+          <a:bodyPr wrap="square" lIns="0" tIns="0" rIns="0" bIns="0" rtlCol="0">
+            <a:spAutoFit/>
+          </a:bodyPr>
+          <a:lstStyle>
+            <a:defPPr>
+              <a:defRPr lang="en-US"/>
+            </a:defPPr>
+            <a:lvl1pPr algn="r">
+              <a:defRPr sz="1400">
+                <a:solidFill>
+                  <a:srgbClr val="0070C0"/>
+                </a:solidFill>
+              </a:defRPr>
+            </a:lvl1pPr>
+          </a:lstStyle>
+          <a:p>
+            <a:r>
+              <a:rPr lang="en-US" dirty="0"/>
+              <a:t>d</a:t>
+            </a:r>
+          </a:p>
+        </p:txBody>
+      </p:sp>
+      <p:sp>
+        <p:nvSpPr>
+          <p:cNvPr id="40" name="Rectangle 62"/>
+          <p:cNvSpPr/>
+          <p:nvPr/>
+        </p:nvSpPr>
+        <p:spPr>
+          <a:xfrm>
+            <a:off x="3962401" y="2625040"/>
+            <a:ext cx="2016419" cy="432035"/>
+          </a:xfrm>
+          <a:prstGeom prst="rect">
+            <a:avLst/>
+          </a:prstGeom>
+          <a:solidFill>
+            <a:srgbClr val="0070C0"/>
+          </a:solidFill>
+          <a:ln w="19050">
+            <a:solidFill>
+              <a:srgbClr val="0070C0"/>
+            </a:solidFill>
+          </a:ln>
+          <a:effectLst/>
+        </p:spPr>
+        <p:style>
+          <a:lnRef idx="1">
+            <a:schemeClr val="accent2"/>
+          </a:lnRef>
+          <a:fillRef idx="2">
+            <a:schemeClr val="accent2"/>
+          </a:fillRef>
+          <a:effectRef idx="1">
+            <a:schemeClr val="accent2"/>
+          </a:effectRef>
+          <a:fontRef idx="minor">
+            <a:schemeClr val="dk1"/>
+          </a:fontRef>
+        </p:style>
+        <p:txBody>
+          <a:bodyPr rtlCol="0" anchor="ctr"/>
+          <a:lstStyle/>
+          <a:p>
+            <a:pPr algn="ctr"/>
+            <a:r>
+              <a:rPr lang="en-US" sz="1600" dirty="0">
+                <a:solidFill>
+                  <a:schemeClr val="bg1"/>
+                </a:solidFill>
+              </a:rPr>
+              <a:t>:</a:t>
+            </a:r>
+            <a:r>
+              <a:rPr lang="en-US" sz="1600" dirty="0" err="1">
+                <a:solidFill>
+                  <a:schemeClr val="bg1"/>
+                </a:solidFill>
+              </a:rPr>
+              <a:t>DeleteCaseCommand</a:t>
+            </a:r>
+            <a:endParaRPr lang="en-US" sz="1600" dirty="0">
+              <a:solidFill>
+                <a:schemeClr val="bg1"/>
+              </a:solidFill>
+            </a:endParaRPr>
+          </a:p>
+          <a:p>
+            <a:pPr algn="ctr"/>
+            <a:r>
+              <a:rPr lang="en-US" sz="1600" dirty="0">
+                <a:solidFill>
+                  <a:schemeClr val="bg1"/>
+                </a:solidFill>
+              </a:rPr>
+              <a:t>Parser</a:t>
+            </a:r>
+            <a:endParaRPr lang="en-SG" sz="1600" dirty="0">
+              <a:solidFill>
+                <a:schemeClr val="bg1"/>
+              </a:solidFill>
+            </a:endParaRPr>
+          </a:p>
+        </p:txBody>
+      </p:sp>
+      <p:cxnSp>
+        <p:nvCxnSpPr>
+          <p:cNvPr id="8" name="Straight Arrow Connector 7"/>
+          <p:cNvCxnSpPr/>
+          <p:nvPr/>
+        </p:nvCxnSpPr>
+        <p:spPr>
+          <a:xfrm>
+            <a:off x="3310191" y="3352801"/>
+            <a:ext cx="1597356" cy="1"/>
+          </a:xfrm>
+          <a:prstGeom prst="straightConnector1">
+            <a:avLst/>
+          </a:prstGeom>
+          <a:ln w="19050">
+            <a:headEnd type="none" w="med" len="med"/>
+            <a:tailEnd type="arrow" w="med" len="med"/>
+          </a:ln>
+        </p:spPr>
+        <p:style>
+          <a:lnRef idx="1">
+            <a:schemeClr val="accent1"/>
+          </a:lnRef>
+          <a:fillRef idx="0">
+            <a:schemeClr val="accent1"/>
+          </a:fillRef>
+          <a:effectRef idx="0">
+            <a:schemeClr val="accent1"/>
+          </a:effectRef>
+          <a:fontRef idx="minor">
+            <a:schemeClr val="tx1"/>
+          </a:fontRef>
+        </p:style>
+      </p:cxnSp>
+      <p:sp>
+        <p:nvSpPr>
+          <p:cNvPr id="45" name="Rectangle 44"/>
+          <p:cNvSpPr/>
+          <p:nvPr/>
+        </p:nvSpPr>
+        <p:spPr>
+          <a:xfrm>
+            <a:off x="4907548" y="3048001"/>
+            <a:ext cx="205843" cy="123165"/>
+          </a:xfrm>
+          <a:prstGeom prst="rect">
+            <a:avLst/>
+          </a:prstGeom>
+          <a:solidFill>
+            <a:srgbClr val="0070C0"/>
+          </a:solidFill>
+          <a:ln>
+            <a:solidFill>
+              <a:srgbClr val="0070C0"/>
+            </a:solidFill>
+          </a:ln>
+          <a:effectLst/>
+        </p:spPr>
+        <p:style>
+          <a:lnRef idx="1">
+            <a:schemeClr val="accent3"/>
+          </a:lnRef>
+          <a:fillRef idx="2">
+            <a:schemeClr val="accent3"/>
+          </a:fillRef>
+          <a:effectRef idx="1">
+            <a:schemeClr val="accent3"/>
+          </a:effectRef>
+          <a:fontRef idx="minor">
+            <a:schemeClr val="dk1"/>
+          </a:fontRef>
+        </p:style>
+        <p:txBody>
+          <a:bodyPr rtlCol="0" anchor="ctr"/>
+          <a:lstStyle/>
+          <a:p>
+            <a:pPr algn="ctr"/>
+            <a:endParaRPr lang="en-SG" sz="1400"/>
+          </a:p>
+        </p:txBody>
+      </p:sp>
+      <p:cxnSp>
+        <p:nvCxnSpPr>
+          <p:cNvPr id="46" name="Straight Connector 45"/>
+          <p:cNvCxnSpPr>
+            <a:stCxn id="45" idx="0"/>
+          </p:cNvCxnSpPr>
+          <p:nvPr/>
+        </p:nvCxnSpPr>
+        <p:spPr>
+          <a:xfrm>
+            <a:off x="5010469" y="3048000"/>
+            <a:ext cx="0" cy="990600"/>
+          </a:xfrm>
+          <a:prstGeom prst="line">
+            <a:avLst/>
+          </a:prstGeom>
+          <a:ln w="19050">
+            <a:solidFill>
+              <a:srgbClr val="0070C0"/>
+            </a:solidFill>
+            <a:prstDash val="sysDash"/>
+          </a:ln>
+          <a:effectLst/>
+        </p:spPr>
+        <p:style>
+          <a:lnRef idx="1">
+            <a:schemeClr val="accent1"/>
+          </a:lnRef>
+          <a:fillRef idx="2">
+            <a:schemeClr val="accent1"/>
+          </a:fillRef>
+          <a:effectRef idx="1">
+            <a:schemeClr val="accent1"/>
+          </a:effectRef>
+          <a:fontRef idx="minor">
+            <a:schemeClr val="dk1"/>
+          </a:fontRef>
+        </p:style>
+      </p:cxnSp>
+      <p:sp>
+        <p:nvSpPr>
+          <p:cNvPr id="49" name="Rectangle 48"/>
+          <p:cNvSpPr/>
+          <p:nvPr/>
+        </p:nvSpPr>
+        <p:spPr>
+          <a:xfrm>
+            <a:off x="4907548" y="3352801"/>
+            <a:ext cx="205843" cy="533400"/>
+          </a:xfrm>
+          <a:prstGeom prst="rect">
+            <a:avLst/>
+          </a:prstGeom>
+          <a:solidFill>
+            <a:srgbClr val="0070C0"/>
+          </a:solidFill>
+          <a:ln>
+            <a:solidFill>
+              <a:srgbClr val="0070C0"/>
+            </a:solidFill>
+          </a:ln>
+          <a:effectLst/>
+        </p:spPr>
+        <p:style>
+          <a:lnRef idx="1">
+            <a:schemeClr val="accent3"/>
+          </a:lnRef>
+          <a:fillRef idx="2">
+            <a:schemeClr val="accent3"/>
+          </a:fillRef>
+          <a:effectRef idx="1">
+            <a:schemeClr val="accent3"/>
+          </a:effectRef>
+          <a:fontRef idx="minor">
+            <a:schemeClr val="dk1"/>
+          </a:fontRef>
+        </p:style>
+        <p:txBody>
+          <a:bodyPr rtlCol="0" anchor="ctr"/>
+          <a:lstStyle/>
+          <a:p>
+            <a:pPr algn="ctr"/>
+            <a:endParaRPr lang="en-SG" sz="1400"/>
+          </a:p>
+        </p:txBody>
+      </p:sp>
+      <p:cxnSp>
+        <p:nvCxnSpPr>
+          <p:cNvPr id="51" name="Straight Arrow Connector 50"/>
+          <p:cNvCxnSpPr/>
+          <p:nvPr/>
+        </p:nvCxnSpPr>
+        <p:spPr>
+          <a:xfrm>
+            <a:off x="3346983" y="3880273"/>
+            <a:ext cx="1667219" cy="0"/>
+          </a:xfrm>
+          <a:prstGeom prst="straightConnector1">
+            <a:avLst/>
+          </a:prstGeom>
+          <a:ln w="19050">
+            <a:solidFill>
+              <a:srgbClr val="0070C0"/>
+            </a:solidFill>
+            <a:prstDash val="sysDash"/>
+            <a:headEnd type="arrow" w="med" len="med"/>
+            <a:tailEnd type="none" w="med" len="med"/>
+          </a:ln>
+        </p:spPr>
+        <p:style>
+          <a:lnRef idx="1">
+            <a:schemeClr val="accent1"/>
+          </a:lnRef>
+          <a:fillRef idx="0">
+            <a:schemeClr val="accent1"/>
+          </a:fillRef>
+          <a:effectRef idx="0">
+            <a:schemeClr val="accent1"/>
+          </a:effectRef>
+          <a:fontRef idx="minor">
+            <a:schemeClr val="tx1"/>
+          </a:fontRef>
+        </p:style>
+      </p:cxnSp>
+      <p:cxnSp>
+        <p:nvCxnSpPr>
+          <p:cNvPr id="13" name="Straight Arrow Connector 12"/>
+          <p:cNvCxnSpPr/>
+          <p:nvPr/>
+        </p:nvCxnSpPr>
+        <p:spPr>
+          <a:xfrm>
+            <a:off x="6705600" y="5286598"/>
+            <a:ext cx="162246" cy="0"/>
+          </a:xfrm>
+          <a:prstGeom prst="straightConnector1">
+            <a:avLst/>
+          </a:prstGeom>
+          <a:ln w="19050">
+            <a:headEnd type="none" w="med" len="med"/>
+            <a:tailEnd type="arrow" w="med" len="med"/>
+          </a:ln>
+        </p:spPr>
+        <p:style>
+          <a:lnRef idx="1">
+            <a:schemeClr val="accent1"/>
+          </a:lnRef>
+          <a:fillRef idx="0">
+            <a:schemeClr val="accent1"/>
+          </a:fillRef>
+          <a:effectRef idx="0">
+            <a:schemeClr val="accent1"/>
+          </a:effectRef>
+          <a:fontRef idx="minor">
+            <a:schemeClr val="tx1"/>
+          </a:fontRef>
+        </p:style>
+      </p:cxnSp>
+      <p:cxnSp>
+        <p:nvCxnSpPr>
+          <p:cNvPr id="50" name="Straight Arrow Connector 49"/>
+          <p:cNvCxnSpPr>
+            <a:cxnSpLocks/>
+          </p:cNvCxnSpPr>
+          <p:nvPr/>
+        </p:nvCxnSpPr>
+        <p:spPr>
+          <a:xfrm>
+            <a:off x="3260026" y="2868204"/>
+            <a:ext cx="702375" cy="0"/>
+          </a:xfrm>
+          <a:prstGeom prst="straightConnector1">
+            <a:avLst/>
+          </a:prstGeom>
+          <a:ln w="19050">
+            <a:solidFill>
+              <a:srgbClr val="0070C0"/>
+            </a:solidFill>
+            <a:tailEnd type="arrow"/>
+          </a:ln>
+        </p:spPr>
+        <p:style>
+          <a:lnRef idx="1">
+            <a:schemeClr val="accent1"/>
+          </a:lnRef>
+          <a:fillRef idx="0">
+            <a:schemeClr val="accent1"/>
+          </a:fillRef>
+          <a:effectRef idx="0">
+            <a:schemeClr val="accent1"/>
+          </a:effectRef>
+          <a:fontRef idx="minor">
+            <a:schemeClr val="tx1"/>
+          </a:fontRef>
+        </p:style>
+      </p:cxnSp>
+      <p:cxnSp>
+        <p:nvCxnSpPr>
+          <p:cNvPr id="52" name="Straight Arrow Connector 51"/>
+          <p:cNvCxnSpPr/>
+          <p:nvPr/>
+        </p:nvCxnSpPr>
+        <p:spPr>
+          <a:xfrm>
+            <a:off x="3307119" y="3171165"/>
+            <a:ext cx="1600428" cy="0"/>
+          </a:xfrm>
+          <a:prstGeom prst="straightConnector1">
+            <a:avLst/>
+          </a:prstGeom>
+          <a:ln w="19050">
+            <a:solidFill>
+              <a:srgbClr val="0070C0"/>
+            </a:solidFill>
+            <a:prstDash val="sysDash"/>
+            <a:headEnd type="arrow" w="med" len="med"/>
+            <a:tailEnd type="none" w="med" len="med"/>
+          </a:ln>
+        </p:spPr>
+        <p:style>
+          <a:lnRef idx="1">
+            <a:schemeClr val="accent1"/>
+          </a:lnRef>
+          <a:fillRef idx="0">
+            <a:schemeClr val="accent1"/>
+          </a:fillRef>
+          <a:effectRef idx="0">
+            <a:schemeClr val="accent1"/>
+          </a:effectRef>
+          <a:fontRef idx="minor">
+            <a:schemeClr val="tx1"/>
+          </a:fontRef>
+        </p:style>
+      </p:cxnSp>
+      <p:sp>
+        <p:nvSpPr>
+          <p:cNvPr id="4" name="TextBox 3"/>
+          <p:cNvSpPr txBox="1"/>
+          <p:nvPr/>
+        </p:nvSpPr>
+        <p:spPr>
+          <a:xfrm>
+            <a:off x="4881265" y="3894790"/>
+            <a:ext cx="258404" cy="261610"/>
+          </a:xfrm>
+          <a:prstGeom prst="rect">
+            <a:avLst/>
+          </a:prstGeom>
+          <a:noFill/>
+        </p:spPr>
+        <p:txBody>
+          <a:bodyPr wrap="none" rtlCol="0">
+            <a:spAutoFit/>
+          </a:bodyPr>
+          <a:lstStyle/>
+          <a:p>
+            <a:r>
+              <a:rPr lang="en-SG" sz="1100" dirty="0">
+                <a:solidFill>
+                  <a:srgbClr val="002060"/>
+                </a:solidFill>
+              </a:rPr>
+              <a:t>X</a:t>
+            </a:r>
+          </a:p>
+        </p:txBody>
+      </p:sp>
+      <p:sp>
+        <p:nvSpPr>
+          <p:cNvPr id="56" name="Rectangle 62"/>
+          <p:cNvSpPr/>
+          <p:nvPr/>
+        </p:nvSpPr>
+        <p:spPr>
+          <a:xfrm>
+            <a:off x="10385514" y="2057400"/>
+            <a:ext cx="1478906" cy="346760"/>
+          </a:xfrm>
+          <a:prstGeom prst="rect">
+            <a:avLst/>
+          </a:prstGeom>
+          <a:solidFill>
+            <a:schemeClr val="accent5">
+              <a:lumMod val="60000"/>
+              <a:lumOff val="40000"/>
+            </a:schemeClr>
+          </a:solidFill>
+          <a:ln w="19050">
+            <a:solidFill>
+              <a:schemeClr val="accent5">
+                <a:lumMod val="60000"/>
+                <a:lumOff val="40000"/>
+              </a:schemeClr>
+            </a:solidFill>
+          </a:ln>
+          <a:effectLst/>
+        </p:spPr>
+        <p:style>
+          <a:lnRef idx="1">
+            <a:schemeClr val="accent2"/>
+          </a:lnRef>
+          <a:fillRef idx="2">
+            <a:schemeClr val="accent2"/>
+          </a:fillRef>
+          <a:effectRef idx="1">
+            <a:schemeClr val="accent2"/>
+          </a:effectRef>
+          <a:fontRef idx="minor">
+            <a:schemeClr val="dk1"/>
+          </a:fontRef>
+        </p:style>
+        <p:txBody>
+          <a:bodyPr rtlCol="0" anchor="ctr"/>
+          <a:lstStyle/>
+          <a:p>
+            <a:pPr algn="ctr"/>
+            <a:r>
+              <a:rPr lang="en-US" sz="1600" dirty="0" smtClean="0">
+                <a:solidFill>
+                  <a:schemeClr val="bg1"/>
+                </a:solidFill>
+              </a:rPr>
+              <a:t>:</a:t>
+            </a:r>
+            <a:r>
+              <a:rPr lang="en-US" sz="1600" dirty="0" err="1" smtClean="0">
+                <a:solidFill>
+                  <a:schemeClr val="bg1"/>
+                </a:solidFill>
+              </a:rPr>
+              <a:t>EventsCenter</a:t>
+            </a:r>
+            <a:endParaRPr lang="en-SG" sz="1600" dirty="0">
+              <a:solidFill>
+                <a:schemeClr val="bg1"/>
+              </a:solidFill>
+            </a:endParaRPr>
+          </a:p>
+        </p:txBody>
+      </p:sp>
+      <p:cxnSp>
+        <p:nvCxnSpPr>
+          <p:cNvPr id="57" name="Straight Connector 56"/>
+          <p:cNvCxnSpPr/>
+          <p:nvPr/>
+        </p:nvCxnSpPr>
+        <p:spPr>
+          <a:xfrm>
+            <a:off x="11129687" y="2396058"/>
+            <a:ext cx="0" cy="3623742"/>
+          </a:xfrm>
+          <a:prstGeom prst="line">
+            <a:avLst/>
+          </a:prstGeom>
+          <a:ln w="19050">
+            <a:solidFill>
+              <a:schemeClr val="accent5">
+                <a:lumMod val="60000"/>
+                <a:lumOff val="40000"/>
+              </a:schemeClr>
+            </a:solidFill>
+            <a:prstDash val="sysDash"/>
+          </a:ln>
+          <a:effectLst/>
+        </p:spPr>
+        <p:style>
+          <a:lnRef idx="1">
+            <a:schemeClr val="accent1"/>
+          </a:lnRef>
+          <a:fillRef idx="2">
+            <a:schemeClr val="accent1"/>
+          </a:fillRef>
+          <a:effectRef idx="1">
+            <a:schemeClr val="accent1"/>
+          </a:effectRef>
+          <a:fontRef idx="minor">
+            <a:schemeClr val="dk1"/>
+          </a:fontRef>
+        </p:style>
+      </p:cxnSp>
+      <p:sp>
+        <p:nvSpPr>
+          <p:cNvPr id="58" name="Rectangle 57"/>
+          <p:cNvSpPr/>
+          <p:nvPr/>
+        </p:nvSpPr>
+        <p:spPr>
+          <a:xfrm>
+            <a:off x="11048767" y="4724400"/>
+            <a:ext cx="152400" cy="199803"/>
+          </a:xfrm>
+          <a:prstGeom prst="rect">
+            <a:avLst/>
+          </a:prstGeom>
+          <a:solidFill>
+            <a:schemeClr val="accent5">
+              <a:lumMod val="60000"/>
+              <a:lumOff val="40000"/>
+            </a:schemeClr>
+          </a:solidFill>
+          <a:ln>
+            <a:solidFill>
+              <a:schemeClr val="accent5">
+                <a:lumMod val="60000"/>
+                <a:lumOff val="40000"/>
+              </a:schemeClr>
+            </a:solidFill>
+          </a:ln>
+          <a:effectLst/>
+        </p:spPr>
+        <p:style>
+          <a:lnRef idx="1">
+            <a:schemeClr val="accent3"/>
+          </a:lnRef>
+          <a:fillRef idx="2">
+            <a:schemeClr val="accent3"/>
+          </a:fillRef>
+          <a:effectRef idx="1">
+            <a:schemeClr val="accent3"/>
+          </a:effectRef>
+          <a:fontRef idx="minor">
+            <a:schemeClr val="dk1"/>
+          </a:fontRef>
+        </p:style>
+        <p:txBody>
+          <a:bodyPr rtlCol="0" anchor="ctr"/>
+          <a:lstStyle/>
+          <a:p>
+            <a:pPr algn="ctr"/>
+            <a:endParaRPr lang="en-SG" sz="1400"/>
+          </a:p>
+        </p:txBody>
+      </p:sp>
+      <p:cxnSp>
+        <p:nvCxnSpPr>
+          <p:cNvPr id="59" name="Straight Arrow Connector 58"/>
+          <p:cNvCxnSpPr/>
+          <p:nvPr/>
+        </p:nvCxnSpPr>
+        <p:spPr>
+          <a:xfrm>
+            <a:off x="6679060" y="4744639"/>
+            <a:ext cx="4369707" cy="0"/>
+          </a:xfrm>
+          <a:prstGeom prst="straightConnector1">
+            <a:avLst/>
+          </a:prstGeom>
+          <a:ln w="19050">
+            <a:solidFill>
+              <a:srgbClr val="0070C0"/>
+            </a:solidFill>
+            <a:tailEnd type="arrow"/>
+          </a:ln>
+        </p:spPr>
+        <p:style>
+          <a:lnRef idx="1">
+            <a:schemeClr val="accent1"/>
+          </a:lnRef>
+          <a:fillRef idx="0">
+            <a:schemeClr val="accent1"/>
+          </a:fillRef>
+          <a:effectRef idx="0">
+            <a:schemeClr val="accent1"/>
+          </a:effectRef>
+          <a:fontRef idx="minor">
+            <a:schemeClr val="tx1"/>
+          </a:fontRef>
+        </p:style>
+      </p:cxnSp>
+      <p:sp>
+        <p:nvSpPr>
+          <p:cNvPr id="62" name="TextBox 61"/>
+          <p:cNvSpPr txBox="1"/>
+          <p:nvPr/>
+        </p:nvSpPr>
+        <p:spPr>
+          <a:xfrm>
+            <a:off x="8737588" y="4432756"/>
+            <a:ext cx="2311179" cy="215444"/>
+          </a:xfrm>
+          <a:prstGeom prst="rect">
+            <a:avLst/>
+          </a:prstGeom>
+          <a:noFill/>
+        </p:spPr>
+        <p:txBody>
+          <a:bodyPr wrap="square" lIns="0" tIns="0" rIns="0" bIns="0" rtlCol="0">
+            <a:spAutoFit/>
+          </a:bodyPr>
+          <a:lstStyle>
+            <a:defPPr>
+              <a:defRPr lang="en-US"/>
+            </a:defPPr>
+            <a:lvl1pPr algn="r">
+              <a:defRPr sz="1400">
+                <a:solidFill>
+                  <a:srgbClr val="0070C0"/>
+                </a:solidFill>
+              </a:defRPr>
+            </a:lvl1pPr>
+          </a:lstStyle>
+          <a:p>
+            <a:r>
+              <a:rPr lang="en-US" dirty="0">
+                <a:solidFill>
+                  <a:schemeClr val="accent5">
+                    <a:lumMod val="75000"/>
+                  </a:schemeClr>
+                </a:solidFill>
+              </a:rPr>
+              <a:t>post(new </a:t>
+            </a:r>
+            <a:r>
+              <a:rPr lang="en-US" dirty="0" err="1">
+                <a:solidFill>
+                  <a:schemeClr val="accent5">
+                    <a:lumMod val="75000"/>
+                  </a:schemeClr>
+                </a:solidFill>
+              </a:rPr>
+              <a:t>SwapTabEvent</a:t>
+            </a:r>
+            <a:r>
+              <a:rPr lang="en-US" dirty="0">
+                <a:solidFill>
+                  <a:schemeClr val="accent5">
+                    <a:lumMod val="75000"/>
+                  </a:schemeClr>
+                </a:solidFill>
+              </a:rPr>
+              <a:t>(1))</a:t>
+            </a:r>
+            <a:endParaRPr lang="en-US" dirty="0">
+              <a:solidFill>
+                <a:schemeClr val="accent5">
+                  <a:lumMod val="75000"/>
+                </a:schemeClr>
+              </a:solidFill>
+            </a:endParaRPr>
+          </a:p>
+        </p:txBody>
+      </p:sp>
+      <p:cxnSp>
+        <p:nvCxnSpPr>
+          <p:cNvPr id="68" name="Straight Arrow Connector 67"/>
+          <p:cNvCxnSpPr/>
+          <p:nvPr/>
+        </p:nvCxnSpPr>
+        <p:spPr>
+          <a:xfrm>
+            <a:off x="6719018" y="4902419"/>
+            <a:ext cx="4405949" cy="6359"/>
+          </a:xfrm>
+          <a:prstGeom prst="straightConnector1">
+            <a:avLst/>
+          </a:prstGeom>
+          <a:ln w="19050">
+            <a:solidFill>
+              <a:schemeClr val="accent5">
+                <a:lumMod val="60000"/>
+                <a:lumOff val="40000"/>
+              </a:schemeClr>
+            </a:solidFill>
+            <a:prstDash val="sysDash"/>
+            <a:headEnd type="arrow" w="med" len="med"/>
+            <a:tailEnd type="none" w="med" len="med"/>
+          </a:ln>
+        </p:spPr>
+        <p:style>
+          <a:lnRef idx="1">
+            <a:schemeClr val="accent1"/>
+          </a:lnRef>
+          <a:fillRef idx="0">
+            <a:schemeClr val="accent1"/>
+          </a:fillRef>
+          <a:effectRef idx="0">
+            <a:schemeClr val="accent1"/>
+          </a:effectRef>
+          <a:fontRef idx="minor">
+            <a:schemeClr val="tx1"/>
+          </a:fontRef>
+        </p:style>
+      </p:cxnSp>
+    </p:spTree>
+    <p:extLst>
+      <p:ext uri="{BB962C8B-B14F-4D97-AF65-F5344CB8AC3E}">
+        <p14:creationId xmlns:p14="http://schemas.microsoft.com/office/powerpoint/2010/main" val="1187828041"/>
+      </p:ext>
+    </p:extLst>
+  </p:cSld>
+  <p:clrMapOvr>
+    <a:masterClrMapping/>
+  </p:clrMapOvr>
+  <p:timing>
+    <p:tnLst>
+      <p:par>
+        <p:cTn id="1" dur="indefinite" restart="never" nodeType="tmRoot"/>
+      </p:par>
+    </p:tnLst>
+  </p:timing>
+</p:sld>
+</file>
+
+<file path=ppt/slides/slide3.xml><?xml version="1.0" encoding="utf-8"?>
+<p:sld xmlns:a="http://schemas.openxmlformats.org/drawingml/2006/main" xmlns:r="http://schemas.openxmlformats.org/officeDocument/2006/relationships" xmlns:p="http://schemas.openxmlformats.org/presentationml/2006/main">
+  <p:cSld>
+    <p:spTree>
+      <p:nvGrpSpPr>
+        <p:cNvPr id="1" name=""/>
+        <p:cNvGrpSpPr/>
+        <p:nvPr/>
+      </p:nvGrpSpPr>
+      <p:grpSpPr>
+        <a:xfrm>
+          <a:off x="0" y="0"/>
+          <a:ext cx="0" cy="0"/>
+          <a:chOff x="0" y="0"/>
+          <a:chExt cx="0" cy="0"/>
+        </a:xfrm>
+      </p:grpSpPr>
+      <p:sp>
+        <p:nvSpPr>
+          <p:cNvPr id="2" name="Rectangle 65"/>
+          <p:cNvSpPr/>
+          <p:nvPr/>
+        </p:nvSpPr>
+        <p:spPr>
+          <a:xfrm>
+            <a:off x="838200" y="1371600"/>
+            <a:ext cx="5638800" cy="2819400"/>
+          </a:xfrm>
+          <a:prstGeom prst="roundRect">
+            <a:avLst>
+              <a:gd name="adj" fmla="val 3484"/>
+            </a:avLst>
+          </a:prstGeom>
+          <a:solidFill>
+            <a:schemeClr val="accent4">
+              <a:lumMod val="20000"/>
+              <a:lumOff val="80000"/>
+            </a:schemeClr>
+          </a:solidFill>
+          <a:ln w="19050">
+            <a:noFill/>
+          </a:ln>
+          <a:effectLst/>
+        </p:spPr>
+        <p:style>
+          <a:lnRef idx="1">
+            <a:schemeClr val="accent2"/>
+          </a:lnRef>
+          <a:fillRef idx="2">
+            <a:schemeClr val="accent2"/>
+          </a:fillRef>
+          <a:effectRef idx="1">
+            <a:schemeClr val="accent2"/>
+          </a:effectRef>
+          <a:fontRef idx="minor">
+            <a:schemeClr val="dk1"/>
+          </a:fontRef>
+        </p:style>
+        <p:txBody>
+          <a:bodyPr rtlCol="0" anchor="t"/>
+          <a:lstStyle/>
+          <a:p>
+            <a:r>
+              <a:rPr lang="en-US" sz="1200" b="1" dirty="0" smtClean="0">
+                <a:solidFill>
+                  <a:srgbClr val="7030A0"/>
+                </a:solidFill>
+              </a:rPr>
+              <a:t>Model</a:t>
+            </a:r>
+            <a:endParaRPr lang="en-SG" sz="1200" b="1" dirty="0">
+              <a:solidFill>
+                <a:srgbClr val="7030A0"/>
+              </a:solidFill>
+            </a:endParaRPr>
+          </a:p>
+        </p:txBody>
+      </p:sp>
+      <p:sp>
+        <p:nvSpPr>
+          <p:cNvPr id="4" name="TextBox 3"/>
+          <p:cNvSpPr txBox="1"/>
+          <p:nvPr/>
+        </p:nvSpPr>
+        <p:spPr>
+          <a:xfrm>
+            <a:off x="-147257" y="2417910"/>
+            <a:ext cx="1589916" cy="215444"/>
+          </a:xfrm>
+          <a:prstGeom prst="rect">
+            <a:avLst/>
+          </a:prstGeom>
+          <a:noFill/>
+        </p:spPr>
+        <p:txBody>
+          <a:bodyPr wrap="square" lIns="0" tIns="0" rIns="0" bIns="0" rtlCol="0">
+            <a:spAutoFit/>
+          </a:bodyPr>
+          <a:lstStyle>
+            <a:defPPr>
+              <a:defRPr lang="en-US"/>
+            </a:defPPr>
+            <a:lvl1pPr algn="r">
+              <a:defRPr sz="1400">
+                <a:solidFill>
+                  <a:srgbClr val="0070C0"/>
+                </a:solidFill>
+              </a:defRPr>
+            </a:lvl1pPr>
+          </a:lstStyle>
+          <a:p>
+            <a:r>
+              <a:rPr lang="en-US" sz="1200" dirty="0" err="1">
+                <a:solidFill>
+                  <a:srgbClr val="7030A0"/>
+                </a:solidFill>
+              </a:rPr>
+              <a:t>deleteCrimeCase</a:t>
+            </a:r>
+            <a:r>
+              <a:rPr lang="en-US" sz="1200" dirty="0">
+                <a:solidFill>
+                  <a:srgbClr val="7030A0"/>
+                </a:solidFill>
+              </a:rPr>
+              <a:t>(c</a:t>
+            </a:r>
+            <a:r>
+              <a:rPr lang="en-US" dirty="0">
+                <a:solidFill>
+                  <a:srgbClr val="7030A0"/>
+                </a:solidFill>
+              </a:rPr>
+              <a:t>)</a:t>
+            </a:r>
+          </a:p>
+        </p:txBody>
+      </p:sp>
+      <p:sp>
+        <p:nvSpPr>
+          <p:cNvPr id="6" name="Rectangle 62"/>
+          <p:cNvSpPr/>
+          <p:nvPr/>
+        </p:nvSpPr>
+        <p:spPr>
+          <a:xfrm>
+            <a:off x="966682" y="1939833"/>
+            <a:ext cx="1517155" cy="346760"/>
+          </a:xfrm>
+          <a:prstGeom prst="rect">
+            <a:avLst/>
+          </a:prstGeom>
+          <a:solidFill>
+            <a:srgbClr val="7030A0"/>
+          </a:solidFill>
+          <a:ln w="19050">
+            <a:solidFill>
+              <a:srgbClr val="7030A0"/>
+            </a:solidFill>
+          </a:ln>
+          <a:effectLst/>
+        </p:spPr>
+        <p:style>
+          <a:lnRef idx="1">
+            <a:schemeClr val="accent2"/>
+          </a:lnRef>
+          <a:fillRef idx="2">
+            <a:schemeClr val="accent2"/>
+          </a:fillRef>
+          <a:effectRef idx="1">
+            <a:schemeClr val="accent2"/>
+          </a:effectRef>
+          <a:fontRef idx="minor">
+            <a:schemeClr val="dk1"/>
+          </a:fontRef>
+        </p:style>
+        <p:txBody>
+          <a:bodyPr rtlCol="0" anchor="ctr"/>
+          <a:lstStyle/>
+          <a:p>
+            <a:pPr algn="ctr"/>
+            <a:r>
+              <a:rPr lang="en-US" sz="1600" dirty="0">
+                <a:solidFill>
+                  <a:schemeClr val="bg1"/>
+                </a:solidFill>
+              </a:rPr>
+              <a:t>:</a:t>
+            </a:r>
+            <a:r>
+              <a:rPr lang="en-US" sz="1600" dirty="0" err="1">
+                <a:solidFill>
+                  <a:schemeClr val="bg1"/>
+                </a:solidFill>
+              </a:rPr>
+              <a:t>ModelManager</a:t>
+            </a:r>
+            <a:endParaRPr lang="en-SG" sz="1600" dirty="0">
+              <a:solidFill>
+                <a:schemeClr val="bg1"/>
+              </a:solidFill>
+            </a:endParaRPr>
+          </a:p>
+        </p:txBody>
+      </p:sp>
+      <p:cxnSp>
+        <p:nvCxnSpPr>
+          <p:cNvPr id="7" name="Straight Connector 6"/>
+          <p:cNvCxnSpPr/>
+          <p:nvPr/>
+        </p:nvCxnSpPr>
+        <p:spPr>
+          <a:xfrm>
+            <a:off x="1725259" y="2286593"/>
+            <a:ext cx="0" cy="1599607"/>
+          </a:xfrm>
+          <a:prstGeom prst="line">
+            <a:avLst/>
+          </a:prstGeom>
+          <a:ln w="19050">
+            <a:solidFill>
+              <a:srgbClr val="7030A0"/>
+            </a:solidFill>
+            <a:prstDash val="sysDash"/>
+          </a:ln>
+          <a:effectLst/>
+        </p:spPr>
+        <p:style>
+          <a:lnRef idx="1">
+            <a:schemeClr val="accent1"/>
+          </a:lnRef>
+          <a:fillRef idx="2">
+            <a:schemeClr val="accent1"/>
+          </a:fillRef>
+          <a:effectRef idx="1">
+            <a:schemeClr val="accent1"/>
+          </a:effectRef>
+          <a:fontRef idx="minor">
+            <a:schemeClr val="dk1"/>
+          </a:fontRef>
+        </p:style>
+      </p:cxnSp>
+      <p:sp>
+        <p:nvSpPr>
+          <p:cNvPr id="8" name="Rectangle 7"/>
+          <p:cNvSpPr/>
+          <p:nvPr/>
+        </p:nvSpPr>
+        <p:spPr>
+          <a:xfrm>
+            <a:off x="1653251" y="2633354"/>
+            <a:ext cx="152400" cy="1252846"/>
+          </a:xfrm>
+          <a:prstGeom prst="rect">
+            <a:avLst/>
+          </a:prstGeom>
+          <a:solidFill>
+            <a:srgbClr val="7030A0"/>
+          </a:solidFill>
+          <a:ln>
+            <a:solidFill>
+              <a:srgbClr val="7030A0"/>
+            </a:solidFill>
+          </a:ln>
+          <a:effectLst/>
+        </p:spPr>
+        <p:style>
+          <a:lnRef idx="1">
+            <a:schemeClr val="accent3"/>
+          </a:lnRef>
+          <a:fillRef idx="2">
+            <a:schemeClr val="accent3"/>
+          </a:fillRef>
+          <a:effectRef idx="1">
+            <a:schemeClr val="accent3"/>
+          </a:effectRef>
+          <a:fontRef idx="minor">
+            <a:schemeClr val="dk1"/>
+          </a:fontRef>
+        </p:style>
+        <p:txBody>
+          <a:bodyPr rtlCol="0" anchor="ctr"/>
+          <a:lstStyle/>
+          <a:p>
+            <a:pPr algn="ctr"/>
+            <a:endParaRPr lang="en-SG" sz="1400"/>
+          </a:p>
+        </p:txBody>
+      </p:sp>
+      <p:cxnSp>
+        <p:nvCxnSpPr>
+          <p:cNvPr id="9" name="Straight Arrow Connector 8"/>
+          <p:cNvCxnSpPr/>
+          <p:nvPr/>
+        </p:nvCxnSpPr>
+        <p:spPr>
+          <a:xfrm>
+            <a:off x="452060" y="3886200"/>
+            <a:ext cx="1196051" cy="0"/>
+          </a:xfrm>
+          <a:prstGeom prst="straightConnector1">
+            <a:avLst/>
+          </a:prstGeom>
+          <a:ln w="19050">
+            <a:solidFill>
+              <a:srgbClr val="7030A0"/>
+            </a:solidFill>
+            <a:prstDash val="sysDash"/>
+            <a:headEnd type="arrow" w="med" len="med"/>
+            <a:tailEnd type="none" w="med" len="med"/>
+          </a:ln>
+        </p:spPr>
+        <p:style>
+          <a:lnRef idx="1">
+            <a:schemeClr val="accent1"/>
+          </a:lnRef>
+          <a:fillRef idx="0">
+            <a:schemeClr val="accent1"/>
+          </a:fillRef>
+          <a:effectRef idx="0">
+            <a:schemeClr val="accent1"/>
+          </a:effectRef>
+          <a:fontRef idx="minor">
+            <a:schemeClr val="tx1"/>
+          </a:fontRef>
+        </p:style>
+      </p:cxnSp>
+      <p:cxnSp>
+        <p:nvCxnSpPr>
+          <p:cNvPr id="11" name="Straight Arrow Connector 10"/>
+          <p:cNvCxnSpPr/>
+          <p:nvPr/>
+        </p:nvCxnSpPr>
+        <p:spPr>
+          <a:xfrm>
+            <a:off x="528260" y="2676153"/>
+            <a:ext cx="1119851" cy="0"/>
+          </a:xfrm>
+          <a:prstGeom prst="straightConnector1">
+            <a:avLst/>
+          </a:prstGeom>
+          <a:ln w="19050">
+            <a:solidFill>
+              <a:schemeClr val="accent1"/>
+            </a:solidFill>
+            <a:tailEnd type="arrow"/>
+          </a:ln>
+        </p:spPr>
+        <p:style>
+          <a:lnRef idx="1">
+            <a:schemeClr val="accent1"/>
+          </a:lnRef>
+          <a:fillRef idx="0">
+            <a:schemeClr val="accent1"/>
+          </a:fillRef>
+          <a:effectRef idx="0">
+            <a:schemeClr val="accent1"/>
+          </a:effectRef>
+          <a:fontRef idx="minor">
+            <a:schemeClr val="tx1"/>
+          </a:fontRef>
+        </p:style>
+      </p:cxnSp>
+      <p:cxnSp>
+        <p:nvCxnSpPr>
+          <p:cNvPr id="12" name="Straight Arrow Connector 11"/>
+          <p:cNvCxnSpPr/>
+          <p:nvPr/>
+        </p:nvCxnSpPr>
+        <p:spPr>
+          <a:xfrm flipV="1">
+            <a:off x="1805651" y="2813179"/>
+            <a:ext cx="1631340" cy="1"/>
+          </a:xfrm>
+          <a:prstGeom prst="straightConnector1">
+            <a:avLst/>
+          </a:prstGeom>
+          <a:ln w="19050">
+            <a:solidFill>
+              <a:srgbClr val="7030A0"/>
+            </a:solidFill>
+            <a:tailEnd type="arrow"/>
+          </a:ln>
+        </p:spPr>
+        <p:style>
+          <a:lnRef idx="1">
+            <a:schemeClr val="accent1"/>
+          </a:lnRef>
+          <a:fillRef idx="0">
+            <a:schemeClr val="accent1"/>
+          </a:fillRef>
+          <a:effectRef idx="0">
+            <a:schemeClr val="accent1"/>
+          </a:effectRef>
+          <a:fontRef idx="minor">
+            <a:schemeClr val="tx1"/>
+          </a:fontRef>
+        </p:style>
+      </p:cxnSp>
+      <p:sp>
+        <p:nvSpPr>
+          <p:cNvPr id="13" name="TextBox 12"/>
+          <p:cNvSpPr txBox="1"/>
+          <p:nvPr/>
+        </p:nvSpPr>
+        <p:spPr>
+          <a:xfrm>
+            <a:off x="1684450" y="2578156"/>
+            <a:ext cx="1716537" cy="184666"/>
+          </a:xfrm>
+          <a:prstGeom prst="rect">
+            <a:avLst/>
+          </a:prstGeom>
+          <a:noFill/>
+        </p:spPr>
+        <p:txBody>
+          <a:bodyPr wrap="square" lIns="0" tIns="0" rIns="0" bIns="0" rtlCol="0">
+            <a:spAutoFit/>
+          </a:bodyPr>
+          <a:lstStyle>
+            <a:defPPr>
+              <a:defRPr lang="en-US"/>
+            </a:defPPr>
+            <a:lvl1pPr algn="r">
+              <a:defRPr sz="1400">
+                <a:solidFill>
+                  <a:srgbClr val="0070C0"/>
+                </a:solidFill>
+              </a:defRPr>
+            </a:lvl1pPr>
+          </a:lstStyle>
+          <a:p>
+            <a:r>
+              <a:rPr lang="en-US" sz="1200" dirty="0" err="1">
+                <a:solidFill>
+                  <a:srgbClr val="7030A0"/>
+                </a:solidFill>
+              </a:rPr>
+              <a:t>removeCrimeCase</a:t>
+            </a:r>
+            <a:r>
+              <a:rPr lang="en-US" sz="1200" dirty="0">
+                <a:solidFill>
+                  <a:srgbClr val="7030A0"/>
+                </a:solidFill>
+              </a:rPr>
+              <a:t>(c)</a:t>
+            </a:r>
+            <a:endParaRPr lang="en-US" sz="1200" dirty="0">
+              <a:solidFill>
+                <a:srgbClr val="7030A0"/>
+              </a:solidFill>
+            </a:endParaRPr>
+          </a:p>
+        </p:txBody>
+      </p:sp>
+      <p:sp>
+        <p:nvSpPr>
+          <p:cNvPr id="14" name="Rectangle 62"/>
+          <p:cNvSpPr/>
+          <p:nvPr/>
+        </p:nvSpPr>
+        <p:spPr>
+          <a:xfrm>
+            <a:off x="2780991" y="1946133"/>
+            <a:ext cx="1447800" cy="346760"/>
+          </a:xfrm>
+          <a:prstGeom prst="rect">
+            <a:avLst/>
+          </a:prstGeom>
+          <a:solidFill>
+            <a:srgbClr val="7030A0"/>
+          </a:solidFill>
+          <a:ln w="19050">
+            <a:solidFill>
+              <a:srgbClr val="7030A0"/>
+            </a:solidFill>
+          </a:ln>
+          <a:effectLst/>
+        </p:spPr>
+        <p:style>
+          <a:lnRef idx="1">
+            <a:schemeClr val="accent2"/>
+          </a:lnRef>
+          <a:fillRef idx="2">
+            <a:schemeClr val="accent2"/>
+          </a:fillRef>
+          <a:effectRef idx="1">
+            <a:schemeClr val="accent2"/>
+          </a:effectRef>
+          <a:fontRef idx="minor">
+            <a:schemeClr val="dk1"/>
+          </a:fontRef>
+        </p:style>
+        <p:txBody>
+          <a:bodyPr rtlCol="0" anchor="ctr"/>
+          <a:lstStyle/>
+          <a:p>
+            <a:pPr algn="ctr"/>
+            <a:r>
+              <a:rPr lang="en-US" sz="1600" dirty="0">
+                <a:solidFill>
+                  <a:schemeClr val="bg1"/>
+                </a:solidFill>
+              </a:rPr>
+              <a:t>:</a:t>
+            </a:r>
+            <a:r>
+              <a:rPr lang="en-US" sz="1600" dirty="0" err="1">
+                <a:solidFill>
+                  <a:schemeClr val="bg1"/>
+                </a:solidFill>
+              </a:rPr>
+              <a:t>Investigapptor</a:t>
+            </a:r>
+            <a:endParaRPr lang="en-SG" sz="1600" dirty="0">
+              <a:solidFill>
+                <a:schemeClr val="bg1"/>
+              </a:solidFill>
+            </a:endParaRPr>
+          </a:p>
+        </p:txBody>
+      </p:sp>
+      <p:cxnSp>
+        <p:nvCxnSpPr>
+          <p:cNvPr id="15" name="Straight Connector 14"/>
+          <p:cNvCxnSpPr/>
+          <p:nvPr/>
+        </p:nvCxnSpPr>
+        <p:spPr>
+          <a:xfrm>
+            <a:off x="3508999" y="2286593"/>
+            <a:ext cx="0" cy="1599607"/>
+          </a:xfrm>
+          <a:prstGeom prst="line">
+            <a:avLst/>
+          </a:prstGeom>
+          <a:ln w="19050">
+            <a:solidFill>
+              <a:srgbClr val="7030A0"/>
+            </a:solidFill>
+            <a:prstDash val="sysDash"/>
+          </a:ln>
+          <a:effectLst/>
+        </p:spPr>
+        <p:style>
+          <a:lnRef idx="1">
+            <a:schemeClr val="accent1"/>
+          </a:lnRef>
+          <a:fillRef idx="2">
+            <a:schemeClr val="accent1"/>
+          </a:fillRef>
+          <a:effectRef idx="1">
+            <a:schemeClr val="accent1"/>
+          </a:effectRef>
+          <a:fontRef idx="minor">
+            <a:schemeClr val="dk1"/>
+          </a:fontRef>
+        </p:style>
+      </p:cxnSp>
+      <p:sp>
+        <p:nvSpPr>
+          <p:cNvPr id="16" name="Rectangle 15"/>
+          <p:cNvSpPr/>
+          <p:nvPr/>
+        </p:nvSpPr>
+        <p:spPr>
+          <a:xfrm>
+            <a:off x="3428609" y="2750390"/>
+            <a:ext cx="152213" cy="958308"/>
+          </a:xfrm>
+          <a:prstGeom prst="rect">
+            <a:avLst/>
+          </a:prstGeom>
+          <a:solidFill>
+            <a:srgbClr val="7030A0"/>
+          </a:solidFill>
+          <a:ln>
+            <a:solidFill>
+              <a:srgbClr val="7030A0"/>
+            </a:solidFill>
+          </a:ln>
+          <a:effectLst/>
+        </p:spPr>
+        <p:style>
+          <a:lnRef idx="1">
+            <a:schemeClr val="accent3"/>
+          </a:lnRef>
+          <a:fillRef idx="2">
+            <a:schemeClr val="accent3"/>
+          </a:fillRef>
+          <a:effectRef idx="1">
+            <a:schemeClr val="accent3"/>
+          </a:effectRef>
+          <a:fontRef idx="minor">
+            <a:schemeClr val="dk1"/>
+          </a:fontRef>
+        </p:style>
+        <p:txBody>
+          <a:bodyPr rtlCol="0" anchor="ctr"/>
+          <a:lstStyle/>
+          <a:p>
+            <a:pPr algn="ctr"/>
+            <a:endParaRPr lang="en-SG" sz="1400"/>
+          </a:p>
+        </p:txBody>
+      </p:sp>
+      <p:cxnSp>
+        <p:nvCxnSpPr>
+          <p:cNvPr id="22" name="Straight Arrow Connector 21"/>
+          <p:cNvCxnSpPr/>
+          <p:nvPr/>
+        </p:nvCxnSpPr>
+        <p:spPr>
+          <a:xfrm flipV="1">
+            <a:off x="3619500" y="2971802"/>
+            <a:ext cx="1665021" cy="1"/>
+          </a:xfrm>
+          <a:prstGeom prst="straightConnector1">
+            <a:avLst/>
+          </a:prstGeom>
+          <a:ln w="19050">
+            <a:solidFill>
+              <a:srgbClr val="7030A0"/>
+            </a:solidFill>
+            <a:tailEnd type="arrow"/>
+          </a:ln>
+        </p:spPr>
+        <p:style>
+          <a:lnRef idx="1">
+            <a:schemeClr val="accent1"/>
+          </a:lnRef>
+          <a:fillRef idx="0">
+            <a:schemeClr val="accent1"/>
+          </a:fillRef>
+          <a:effectRef idx="0">
+            <a:schemeClr val="accent1"/>
+          </a:effectRef>
+          <a:fontRef idx="minor">
+            <a:schemeClr val="tx1"/>
+          </a:fontRef>
+        </p:style>
+      </p:cxnSp>
+      <p:sp>
+        <p:nvSpPr>
+          <p:cNvPr id="28" name="TextBox 27"/>
+          <p:cNvSpPr txBox="1"/>
+          <p:nvPr/>
+        </p:nvSpPr>
+        <p:spPr>
+          <a:xfrm>
+            <a:off x="4309181" y="2767311"/>
+            <a:ext cx="812397" cy="184666"/>
+          </a:xfrm>
+          <a:prstGeom prst="rect">
+            <a:avLst/>
+          </a:prstGeom>
+          <a:noFill/>
+        </p:spPr>
+        <p:txBody>
+          <a:bodyPr wrap="square" lIns="0" tIns="0" rIns="0" bIns="0" rtlCol="0">
+            <a:spAutoFit/>
+          </a:bodyPr>
+          <a:lstStyle>
+            <a:defPPr>
+              <a:defRPr lang="en-US"/>
+            </a:defPPr>
+            <a:lvl1pPr algn="r">
+              <a:defRPr sz="1400">
+                <a:solidFill>
+                  <a:srgbClr val="0070C0"/>
+                </a:solidFill>
+              </a:defRPr>
+            </a:lvl1pPr>
+          </a:lstStyle>
+          <a:p>
+            <a:r>
+              <a:rPr lang="en-US" sz="1200" dirty="0" smtClean="0">
+                <a:solidFill>
+                  <a:srgbClr val="7030A0"/>
+                </a:solidFill>
+              </a:rPr>
+              <a:t>remove(c)</a:t>
+            </a:r>
+            <a:endParaRPr lang="en-US" sz="1200" dirty="0">
+              <a:solidFill>
+                <a:srgbClr val="7030A0"/>
+              </a:solidFill>
+            </a:endParaRPr>
+          </a:p>
+        </p:txBody>
+      </p:sp>
+      <p:cxnSp>
+        <p:nvCxnSpPr>
+          <p:cNvPr id="30" name="Straight Arrow Connector 29"/>
+          <p:cNvCxnSpPr/>
+          <p:nvPr/>
+        </p:nvCxnSpPr>
+        <p:spPr>
+          <a:xfrm>
+            <a:off x="3611920" y="3587643"/>
+            <a:ext cx="1672601" cy="0"/>
+          </a:xfrm>
+          <a:prstGeom prst="straightConnector1">
+            <a:avLst/>
+          </a:prstGeom>
+          <a:ln w="19050">
+            <a:solidFill>
+              <a:srgbClr val="7030A0"/>
+            </a:solidFill>
+            <a:prstDash val="sysDash"/>
+            <a:headEnd type="arrow" w="med" len="med"/>
+            <a:tailEnd type="none" w="med" len="med"/>
+          </a:ln>
+        </p:spPr>
+        <p:style>
+          <a:lnRef idx="1">
+            <a:schemeClr val="accent1"/>
+          </a:lnRef>
+          <a:fillRef idx="0">
+            <a:schemeClr val="accent1"/>
+          </a:fillRef>
+          <a:effectRef idx="0">
+            <a:schemeClr val="accent1"/>
+          </a:effectRef>
+          <a:fontRef idx="minor">
+            <a:schemeClr val="tx1"/>
+          </a:fontRef>
+        </p:style>
+      </p:cxnSp>
+      <p:cxnSp>
+        <p:nvCxnSpPr>
+          <p:cNvPr id="32" name="Straight Arrow Connector 31"/>
+          <p:cNvCxnSpPr/>
+          <p:nvPr/>
+        </p:nvCxnSpPr>
+        <p:spPr>
+          <a:xfrm>
+            <a:off x="1805651" y="3708697"/>
+            <a:ext cx="1631340" cy="0"/>
+          </a:xfrm>
+          <a:prstGeom prst="straightConnector1">
+            <a:avLst/>
+          </a:prstGeom>
+          <a:ln w="19050">
+            <a:solidFill>
+              <a:srgbClr val="7030A0"/>
+            </a:solidFill>
+            <a:prstDash val="sysDash"/>
+            <a:headEnd type="arrow" w="med" len="med"/>
+            <a:tailEnd type="none" w="med" len="med"/>
+          </a:ln>
+        </p:spPr>
+        <p:style>
+          <a:lnRef idx="1">
+            <a:schemeClr val="accent1"/>
+          </a:lnRef>
+          <a:fillRef idx="0">
+            <a:schemeClr val="accent1"/>
+          </a:fillRef>
+          <a:effectRef idx="0">
+            <a:schemeClr val="accent1"/>
+          </a:effectRef>
+          <a:fontRef idx="minor">
+            <a:schemeClr val="tx1"/>
+          </a:fontRef>
+        </p:style>
+      </p:cxnSp>
+      <p:sp>
+        <p:nvSpPr>
+          <p:cNvPr id="36" name="Rectangle 62"/>
+          <p:cNvSpPr/>
+          <p:nvPr/>
+        </p:nvSpPr>
+        <p:spPr>
+          <a:xfrm>
+            <a:off x="4315372" y="2374472"/>
+            <a:ext cx="2009228" cy="345472"/>
+          </a:xfrm>
+          <a:prstGeom prst="rect">
+            <a:avLst/>
+          </a:prstGeom>
+          <a:solidFill>
+            <a:srgbClr val="7030A0"/>
+          </a:solidFill>
+          <a:ln w="19050">
+            <a:solidFill>
+              <a:srgbClr val="7030A0"/>
+            </a:solidFill>
+          </a:ln>
+          <a:effectLst/>
+        </p:spPr>
+        <p:style>
+          <a:lnRef idx="1">
+            <a:schemeClr val="accent2"/>
+          </a:lnRef>
+          <a:fillRef idx="2">
+            <a:schemeClr val="accent2"/>
+          </a:fillRef>
+          <a:effectRef idx="1">
+            <a:schemeClr val="accent2"/>
+          </a:effectRef>
+          <a:fontRef idx="minor">
+            <a:schemeClr val="dk1"/>
+          </a:fontRef>
+        </p:style>
+        <p:txBody>
+          <a:bodyPr rtlCol="0" anchor="ctr"/>
+          <a:lstStyle/>
+          <a:p>
+            <a:pPr algn="ctr"/>
+            <a:r>
+              <a:rPr lang="en-US" sz="1600" smtClean="0">
+                <a:solidFill>
+                  <a:schemeClr val="bg1"/>
+                </a:solidFill>
+              </a:rPr>
+              <a:t>UniqueCrimeCaseList</a:t>
+            </a:r>
+            <a:endParaRPr lang="en-SG" sz="1600" dirty="0">
+              <a:solidFill>
+                <a:schemeClr val="bg1"/>
+              </a:solidFill>
+            </a:endParaRPr>
+          </a:p>
+        </p:txBody>
+      </p:sp>
+      <p:cxnSp>
+        <p:nvCxnSpPr>
+          <p:cNvPr id="38" name="Straight Connector 37"/>
+          <p:cNvCxnSpPr/>
+          <p:nvPr/>
+        </p:nvCxnSpPr>
+        <p:spPr>
+          <a:xfrm>
+            <a:off x="5364562" y="2719944"/>
+            <a:ext cx="0" cy="1166256"/>
+          </a:xfrm>
+          <a:prstGeom prst="line">
+            <a:avLst/>
+          </a:prstGeom>
+          <a:ln w="19050">
+            <a:solidFill>
+              <a:srgbClr val="7030A0"/>
+            </a:solidFill>
+            <a:prstDash val="sysDash"/>
+          </a:ln>
+          <a:effectLst/>
+        </p:spPr>
+        <p:style>
+          <a:lnRef idx="1">
+            <a:schemeClr val="accent1"/>
+          </a:lnRef>
+          <a:fillRef idx="2">
+            <a:schemeClr val="accent1"/>
+          </a:fillRef>
+          <a:effectRef idx="1">
+            <a:schemeClr val="accent1"/>
+          </a:effectRef>
+          <a:fontRef idx="minor">
+            <a:schemeClr val="dk1"/>
+          </a:fontRef>
+        </p:style>
+      </p:cxnSp>
+      <p:sp>
+        <p:nvSpPr>
+          <p:cNvPr id="47" name="Rectangle 46"/>
+          <p:cNvSpPr/>
+          <p:nvPr/>
+        </p:nvSpPr>
+        <p:spPr>
+          <a:xfrm>
+            <a:off x="5284520" y="2898177"/>
+            <a:ext cx="146997" cy="810520"/>
+          </a:xfrm>
+          <a:prstGeom prst="rect">
+            <a:avLst/>
+          </a:prstGeom>
+          <a:solidFill>
+            <a:srgbClr val="7030A0"/>
+          </a:solidFill>
+          <a:ln>
+            <a:solidFill>
+              <a:srgbClr val="7030A0"/>
+            </a:solidFill>
+          </a:ln>
+          <a:effectLst/>
+        </p:spPr>
+        <p:style>
+          <a:lnRef idx="1">
+            <a:schemeClr val="accent3"/>
+          </a:lnRef>
+          <a:fillRef idx="2">
+            <a:schemeClr val="accent3"/>
+          </a:fillRef>
+          <a:effectRef idx="1">
+            <a:schemeClr val="accent3"/>
+          </a:effectRef>
+          <a:fontRef idx="minor">
+            <a:schemeClr val="dk1"/>
+          </a:fontRef>
+        </p:style>
+        <p:txBody>
+          <a:bodyPr rtlCol="0" anchor="ctr"/>
+          <a:lstStyle/>
+          <a:p>
+            <a:pPr algn="ctr"/>
+            <a:endParaRPr lang="en-SG" sz="1400"/>
+          </a:p>
+        </p:txBody>
+      </p:sp>
+    </p:spTree>
+    <p:extLst>
+      <p:ext uri="{BB962C8B-B14F-4D97-AF65-F5344CB8AC3E}">
+        <p14:creationId xmlns:p14="http://schemas.microsoft.com/office/powerpoint/2010/main" val="557521413"/>
+      </p:ext>
+    </p:extLst>
+  </p:cSld>
+  <p:clrMapOvr>
+    <a:masterClrMapping/>
+  </p:clrMapOvr>
+  <p:timing>
+    <p:tnLst>
+      <p:par>
+        <p:cTn id="1" dur="indefinite" restart="never" nodeType="tmRoot"/>
+      </p:par>
+    </p:tnLst>
+  </p:timing>
 </p:sld>
 </file>
 

</xml_diff>